<commit_message>
finish implementation; add presentation
</commit_message>
<xml_diff>
--- a/doc/presentation.pptx
+++ b/doc/presentation.pptx
@@ -4,6 +4,16 @@
   <p:sldMasterIdLst>
     <p:sldMasterId id="2147483648" r:id="rId1"/>
   </p:sldMasterIdLst>
+  <p:notesMasterIdLst>
+    <p:notesMasterId r:id="rId7"/>
+  </p:notesMasterIdLst>
+  <p:sldIdLst>
+    <p:sldId id="256" r:id="rId2"/>
+    <p:sldId id="257" r:id="rId3"/>
+    <p:sldId id="258" r:id="rId4"/>
+    <p:sldId id="259" r:id="rId5"/>
+    <p:sldId id="260" r:id="rId6"/>
+  </p:sldIdLst>
   <p:sldSz cx="9144000" cy="6858000" type="screen4x3"/>
   <p:notesSz cx="6858000" cy="9144000"/>
   <p:defaultTextStyle>
@@ -101,7 +111,732 @@
       </a:defRPr>
     </a:lvl9pPr>
   </p:defaultTextStyle>
+  <p:extLst>
+    <p:ext uri="{EFAFB233-063F-42B5-8137-9DF3F51BA10A}">
+      <p15:sldGuideLst xmlns:p15="http://schemas.microsoft.com/office/powerpoint/2012/main">
+        <p15:guide id="1" orient="horz" pos="2160">
+          <p15:clr>
+            <a:srgbClr val="A4A3A4"/>
+          </p15:clr>
+        </p15:guide>
+        <p15:guide id="2" pos="2880">
+          <p15:clr>
+            <a:srgbClr val="A4A3A4"/>
+          </p15:clr>
+        </p15:guide>
+      </p15:sldGuideLst>
+    </p:ext>
+  </p:extLst>
 </p:presentation>
+</file>
+
+<file path=ppt/revisionInfo.xml><?xml version="1.0" encoding="utf-8"?>
+<p1510:revInfo xmlns:a="http://schemas.openxmlformats.org/drawingml/2006/main" xmlns:r="http://schemas.openxmlformats.org/officeDocument/2006/relationships" xmlns:p1510="http://schemas.microsoft.com/office/powerpoint/2015/10/main"/>
+</file>
+
+<file path=ppt/notesMasters/notesMaster1.xml><?xml version="1.0" encoding="utf-8"?>
+<p:notesMaster xmlns:a="http://schemas.openxmlformats.org/drawingml/2006/main" xmlns:r="http://schemas.openxmlformats.org/officeDocument/2006/relationships" xmlns:p="http://schemas.openxmlformats.org/presentationml/2006/main">
+  <p:cSld>
+    <p:bg>
+      <p:bgRef idx="1001">
+        <a:schemeClr val="bg1"/>
+      </p:bgRef>
+    </p:bg>
+    <p:spTree>
+      <p:nvGrpSpPr>
+        <p:cNvPr id="1" name=""/>
+        <p:cNvGrpSpPr/>
+        <p:nvPr/>
+      </p:nvGrpSpPr>
+      <p:grpSpPr>
+        <a:xfrm>
+          <a:off x="0" y="0"/>
+          <a:ext cx="0" cy="0"/>
+          <a:chOff x="0" y="0"/>
+          <a:chExt cx="0" cy="0"/>
+        </a:xfrm>
+      </p:grpSpPr>
+      <p:sp>
+        <p:nvSpPr>
+          <p:cNvPr id="2" name="Kopfzeilenplatzhalter 1"/>
+          <p:cNvSpPr>
+            <a:spLocks noGrp="1"/>
+          </p:cNvSpPr>
+          <p:nvPr>
+            <p:ph type="hdr" sz="quarter"/>
+          </p:nvPr>
+        </p:nvSpPr>
+        <p:spPr>
+          <a:xfrm>
+            <a:off x="0" y="0"/>
+            <a:ext cx="2971800" cy="458788"/>
+          </a:xfrm>
+          <a:prstGeom prst="rect">
+            <a:avLst/>
+          </a:prstGeom>
+        </p:spPr>
+        <p:txBody>
+          <a:bodyPr vert="horz" lIns="91440" tIns="45720" rIns="91440" bIns="45720" rtlCol="0"/>
+          <a:lstStyle>
+            <a:lvl1pPr algn="l">
+              <a:defRPr sz="1200"/>
+            </a:lvl1pPr>
+          </a:lstStyle>
+          <a:p>
+            <a:endParaRPr lang="en-US"/>
+          </a:p>
+        </p:txBody>
+      </p:sp>
+      <p:sp>
+        <p:nvSpPr>
+          <p:cNvPr id="3" name="Datumsplatzhalter 2"/>
+          <p:cNvSpPr>
+            <a:spLocks noGrp="1"/>
+          </p:cNvSpPr>
+          <p:nvPr>
+            <p:ph type="dt" idx="1"/>
+          </p:nvPr>
+        </p:nvSpPr>
+        <p:spPr>
+          <a:xfrm>
+            <a:off x="3884613" y="0"/>
+            <a:ext cx="2971800" cy="458788"/>
+          </a:xfrm>
+          <a:prstGeom prst="rect">
+            <a:avLst/>
+          </a:prstGeom>
+        </p:spPr>
+        <p:txBody>
+          <a:bodyPr vert="horz" lIns="91440" tIns="45720" rIns="91440" bIns="45720" rtlCol="0"/>
+          <a:lstStyle>
+            <a:lvl1pPr algn="r">
+              <a:defRPr sz="1200"/>
+            </a:lvl1pPr>
+          </a:lstStyle>
+          <a:p>
+            <a:fld id="{A4DACDB1-671E-4A68-8FB2-54674BF34A9F}" type="datetimeFigureOut">
+              <a:rPr lang="en-US" smtClean="0"/>
+              <a:t>1/3/2018</a:t>
+            </a:fld>
+            <a:endParaRPr lang="en-US"/>
+          </a:p>
+        </p:txBody>
+      </p:sp>
+      <p:sp>
+        <p:nvSpPr>
+          <p:cNvPr id="4" name="Folienbildplatzhalter 3"/>
+          <p:cNvSpPr>
+            <a:spLocks noGrp="1" noRot="1" noChangeAspect="1"/>
+          </p:cNvSpPr>
+          <p:nvPr>
+            <p:ph type="sldImg" idx="2"/>
+          </p:nvPr>
+        </p:nvSpPr>
+        <p:spPr>
+          <a:xfrm>
+            <a:off x="1371600" y="1143000"/>
+            <a:ext cx="4114800" cy="3086100"/>
+          </a:xfrm>
+          <a:prstGeom prst="rect">
+            <a:avLst/>
+          </a:prstGeom>
+          <a:noFill/>
+          <a:ln w="12700">
+            <a:solidFill>
+              <a:prstClr val="black"/>
+            </a:solidFill>
+          </a:ln>
+        </p:spPr>
+        <p:txBody>
+          <a:bodyPr vert="horz" lIns="91440" tIns="45720" rIns="91440" bIns="45720" rtlCol="0" anchor="ctr"/>
+          <a:lstStyle/>
+          <a:p>
+            <a:endParaRPr lang="en-US"/>
+          </a:p>
+        </p:txBody>
+      </p:sp>
+      <p:sp>
+        <p:nvSpPr>
+          <p:cNvPr id="5" name="Notizenplatzhalter 4"/>
+          <p:cNvSpPr>
+            <a:spLocks noGrp="1"/>
+          </p:cNvSpPr>
+          <p:nvPr>
+            <p:ph type="body" sz="quarter" idx="3"/>
+          </p:nvPr>
+        </p:nvSpPr>
+        <p:spPr>
+          <a:xfrm>
+            <a:off x="685800" y="4400550"/>
+            <a:ext cx="5486400" cy="3600450"/>
+          </a:xfrm>
+          <a:prstGeom prst="rect">
+            <a:avLst/>
+          </a:prstGeom>
+        </p:spPr>
+        <p:txBody>
+          <a:bodyPr vert="horz" lIns="91440" tIns="45720" rIns="91440" bIns="45720" rtlCol="0"/>
+          <a:lstStyle/>
+          <a:p>
+            <a:pPr lvl="0"/>
+            <a:r>
+              <a:rPr lang="de-DE"/>
+              <a:t>Formatvorlagen des Textmasters bearbeiten</a:t>
+            </a:r>
+          </a:p>
+          <a:p>
+            <a:pPr lvl="1"/>
+            <a:r>
+              <a:rPr lang="de-DE"/>
+              <a:t>Zweite Ebene</a:t>
+            </a:r>
+          </a:p>
+          <a:p>
+            <a:pPr lvl="2"/>
+            <a:r>
+              <a:rPr lang="de-DE"/>
+              <a:t>Dritte Ebene</a:t>
+            </a:r>
+          </a:p>
+          <a:p>
+            <a:pPr lvl="3"/>
+            <a:r>
+              <a:rPr lang="de-DE"/>
+              <a:t>Vierte Ebene</a:t>
+            </a:r>
+          </a:p>
+          <a:p>
+            <a:pPr lvl="4"/>
+            <a:r>
+              <a:rPr lang="de-DE"/>
+              <a:t>Fünfte Ebene</a:t>
+            </a:r>
+            <a:endParaRPr lang="en-US"/>
+          </a:p>
+        </p:txBody>
+      </p:sp>
+      <p:sp>
+        <p:nvSpPr>
+          <p:cNvPr id="6" name="Fußzeilenplatzhalter 5"/>
+          <p:cNvSpPr>
+            <a:spLocks noGrp="1"/>
+          </p:cNvSpPr>
+          <p:nvPr>
+            <p:ph type="ftr" sz="quarter" idx="4"/>
+          </p:nvPr>
+        </p:nvSpPr>
+        <p:spPr>
+          <a:xfrm>
+            <a:off x="0" y="8685213"/>
+            <a:ext cx="2971800" cy="458787"/>
+          </a:xfrm>
+          <a:prstGeom prst="rect">
+            <a:avLst/>
+          </a:prstGeom>
+        </p:spPr>
+        <p:txBody>
+          <a:bodyPr vert="horz" lIns="91440" tIns="45720" rIns="91440" bIns="45720" rtlCol="0" anchor="b"/>
+          <a:lstStyle>
+            <a:lvl1pPr algn="l">
+              <a:defRPr sz="1200"/>
+            </a:lvl1pPr>
+          </a:lstStyle>
+          <a:p>
+            <a:endParaRPr lang="en-US"/>
+          </a:p>
+        </p:txBody>
+      </p:sp>
+      <p:sp>
+        <p:nvSpPr>
+          <p:cNvPr id="7" name="Foliennummernplatzhalter 6"/>
+          <p:cNvSpPr>
+            <a:spLocks noGrp="1"/>
+          </p:cNvSpPr>
+          <p:nvPr>
+            <p:ph type="sldNum" sz="quarter" idx="5"/>
+          </p:nvPr>
+        </p:nvSpPr>
+        <p:spPr>
+          <a:xfrm>
+            <a:off x="3884613" y="8685213"/>
+            <a:ext cx="2971800" cy="458787"/>
+          </a:xfrm>
+          <a:prstGeom prst="rect">
+            <a:avLst/>
+          </a:prstGeom>
+        </p:spPr>
+        <p:txBody>
+          <a:bodyPr vert="horz" lIns="91440" tIns="45720" rIns="91440" bIns="45720" rtlCol="0" anchor="b"/>
+          <a:lstStyle>
+            <a:lvl1pPr algn="r">
+              <a:defRPr sz="1200"/>
+            </a:lvl1pPr>
+          </a:lstStyle>
+          <a:p>
+            <a:fld id="{1B8AAE5C-07F5-4A0A-836C-CDCB56A83837}" type="slidenum">
+              <a:rPr lang="en-US" smtClean="0"/>
+              <a:t>‹Nr.›</a:t>
+            </a:fld>
+            <a:endParaRPr lang="en-US"/>
+          </a:p>
+        </p:txBody>
+      </p:sp>
+    </p:spTree>
+    <p:extLst>
+      <p:ext uri="{BB962C8B-B14F-4D97-AF65-F5344CB8AC3E}">
+        <p14:creationId xmlns:p14="http://schemas.microsoft.com/office/powerpoint/2010/main" val="1419981960"/>
+      </p:ext>
+    </p:extLst>
+  </p:cSld>
+  <p:clrMap bg1="lt1" tx1="dk1" bg2="lt2" tx2="dk2" accent1="accent1" accent2="accent2" accent3="accent3" accent4="accent4" accent5="accent5" accent6="accent6" hlink="hlink" folHlink="folHlink"/>
+  <p:notesStyle>
+    <a:lvl1pPr marL="0" algn="l" defTabSz="914400" rtl="0" eaLnBrk="1" latinLnBrk="0" hangingPunct="1">
+      <a:defRPr sz="1200" kern="1200">
+        <a:solidFill>
+          <a:schemeClr val="tx1"/>
+        </a:solidFill>
+        <a:latin typeface="+mn-lt"/>
+        <a:ea typeface="+mn-ea"/>
+        <a:cs typeface="+mn-cs"/>
+      </a:defRPr>
+    </a:lvl1pPr>
+    <a:lvl2pPr marL="457200" algn="l" defTabSz="914400" rtl="0" eaLnBrk="1" latinLnBrk="0" hangingPunct="1">
+      <a:defRPr sz="1200" kern="1200">
+        <a:solidFill>
+          <a:schemeClr val="tx1"/>
+        </a:solidFill>
+        <a:latin typeface="+mn-lt"/>
+        <a:ea typeface="+mn-ea"/>
+        <a:cs typeface="+mn-cs"/>
+      </a:defRPr>
+    </a:lvl2pPr>
+    <a:lvl3pPr marL="914400" algn="l" defTabSz="914400" rtl="0" eaLnBrk="1" latinLnBrk="0" hangingPunct="1">
+      <a:defRPr sz="1200" kern="1200">
+        <a:solidFill>
+          <a:schemeClr val="tx1"/>
+        </a:solidFill>
+        <a:latin typeface="+mn-lt"/>
+        <a:ea typeface="+mn-ea"/>
+        <a:cs typeface="+mn-cs"/>
+      </a:defRPr>
+    </a:lvl3pPr>
+    <a:lvl4pPr marL="1371600" algn="l" defTabSz="914400" rtl="0" eaLnBrk="1" latinLnBrk="0" hangingPunct="1">
+      <a:defRPr sz="1200" kern="1200">
+        <a:solidFill>
+          <a:schemeClr val="tx1"/>
+        </a:solidFill>
+        <a:latin typeface="+mn-lt"/>
+        <a:ea typeface="+mn-ea"/>
+        <a:cs typeface="+mn-cs"/>
+      </a:defRPr>
+    </a:lvl4pPr>
+    <a:lvl5pPr marL="1828800" algn="l" defTabSz="914400" rtl="0" eaLnBrk="1" latinLnBrk="0" hangingPunct="1">
+      <a:defRPr sz="1200" kern="1200">
+        <a:solidFill>
+          <a:schemeClr val="tx1"/>
+        </a:solidFill>
+        <a:latin typeface="+mn-lt"/>
+        <a:ea typeface="+mn-ea"/>
+        <a:cs typeface="+mn-cs"/>
+      </a:defRPr>
+    </a:lvl5pPr>
+    <a:lvl6pPr marL="2286000" algn="l" defTabSz="914400" rtl="0" eaLnBrk="1" latinLnBrk="0" hangingPunct="1">
+      <a:defRPr sz="1200" kern="1200">
+        <a:solidFill>
+          <a:schemeClr val="tx1"/>
+        </a:solidFill>
+        <a:latin typeface="+mn-lt"/>
+        <a:ea typeface="+mn-ea"/>
+        <a:cs typeface="+mn-cs"/>
+      </a:defRPr>
+    </a:lvl6pPr>
+    <a:lvl7pPr marL="2743200" algn="l" defTabSz="914400" rtl="0" eaLnBrk="1" latinLnBrk="0" hangingPunct="1">
+      <a:defRPr sz="1200" kern="1200">
+        <a:solidFill>
+          <a:schemeClr val="tx1"/>
+        </a:solidFill>
+        <a:latin typeface="+mn-lt"/>
+        <a:ea typeface="+mn-ea"/>
+        <a:cs typeface="+mn-cs"/>
+      </a:defRPr>
+    </a:lvl7pPr>
+    <a:lvl8pPr marL="3200400" algn="l" defTabSz="914400" rtl="0" eaLnBrk="1" latinLnBrk="0" hangingPunct="1">
+      <a:defRPr sz="1200" kern="1200">
+        <a:solidFill>
+          <a:schemeClr val="tx1"/>
+        </a:solidFill>
+        <a:latin typeface="+mn-lt"/>
+        <a:ea typeface="+mn-ea"/>
+        <a:cs typeface="+mn-cs"/>
+      </a:defRPr>
+    </a:lvl8pPr>
+    <a:lvl9pPr marL="3657600" algn="l" defTabSz="914400" rtl="0" eaLnBrk="1" latinLnBrk="0" hangingPunct="1">
+      <a:defRPr sz="1200" kern="1200">
+        <a:solidFill>
+          <a:schemeClr val="tx1"/>
+        </a:solidFill>
+        <a:latin typeface="+mn-lt"/>
+        <a:ea typeface="+mn-ea"/>
+        <a:cs typeface="+mn-cs"/>
+      </a:defRPr>
+    </a:lvl9pPr>
+  </p:notesStyle>
+</p:notesMaster>
+</file>
+
+<file path=ppt/notesSlides/notesSlide1.xml><?xml version="1.0" encoding="utf-8"?>
+<p:notes xmlns:a="http://schemas.openxmlformats.org/drawingml/2006/main" xmlns:r="http://schemas.openxmlformats.org/officeDocument/2006/relationships" xmlns:p="http://schemas.openxmlformats.org/presentationml/2006/main">
+  <p:cSld>
+    <p:spTree>
+      <p:nvGrpSpPr>
+        <p:cNvPr id="1" name=""/>
+        <p:cNvGrpSpPr/>
+        <p:nvPr/>
+      </p:nvGrpSpPr>
+      <p:grpSpPr>
+        <a:xfrm>
+          <a:off x="0" y="0"/>
+          <a:ext cx="0" cy="0"/>
+          <a:chOff x="0" y="0"/>
+          <a:chExt cx="0" cy="0"/>
+        </a:xfrm>
+      </p:grpSpPr>
+      <p:sp>
+        <p:nvSpPr>
+          <p:cNvPr id="2" name="Folienbildplatzhalter 1"/>
+          <p:cNvSpPr>
+            <a:spLocks noGrp="1" noRot="1" noChangeAspect="1"/>
+          </p:cNvSpPr>
+          <p:nvPr>
+            <p:ph type="sldImg"/>
+          </p:nvPr>
+        </p:nvSpPr>
+        <p:spPr/>
+      </p:sp>
+      <p:sp>
+        <p:nvSpPr>
+          <p:cNvPr id="3" name="Notizenplatzhalter 2"/>
+          <p:cNvSpPr>
+            <a:spLocks noGrp="1"/>
+          </p:cNvSpPr>
+          <p:nvPr>
+            <p:ph type="body" idx="1"/>
+          </p:nvPr>
+        </p:nvSpPr>
+        <p:spPr/>
+        <p:txBody>
+          <a:bodyPr/>
+          <a:lstStyle/>
+          <a:p>
+            <a:endParaRPr lang="en-US" dirty="0"/>
+          </a:p>
+          <a:p>
+            <a:r>
+              <a:rPr lang="en-US" dirty="0"/>
+              <a:t>Features:</a:t>
+            </a:r>
+          </a:p>
+          <a:p>
+            <a:r>
+              <a:rPr lang="en-US" dirty="0"/>
+              <a:t>- </a:t>
+            </a:r>
+          </a:p>
+        </p:txBody>
+      </p:sp>
+      <p:sp>
+        <p:nvSpPr>
+          <p:cNvPr id="4" name="Foliennummernplatzhalter 3"/>
+          <p:cNvSpPr>
+            <a:spLocks noGrp="1"/>
+          </p:cNvSpPr>
+          <p:nvPr>
+            <p:ph type="sldNum" sz="quarter" idx="10"/>
+          </p:nvPr>
+        </p:nvSpPr>
+        <p:spPr/>
+        <p:txBody>
+          <a:bodyPr/>
+          <a:lstStyle/>
+          <a:p>
+            <a:fld id="{1B8AAE5C-07F5-4A0A-836C-CDCB56A83837}" type="slidenum">
+              <a:rPr lang="en-US" smtClean="0"/>
+              <a:t>2</a:t>
+            </a:fld>
+            <a:endParaRPr lang="en-US"/>
+          </a:p>
+        </p:txBody>
+      </p:sp>
+    </p:spTree>
+    <p:extLst>
+      <p:ext uri="{BB962C8B-B14F-4D97-AF65-F5344CB8AC3E}">
+        <p14:creationId xmlns:p14="http://schemas.microsoft.com/office/powerpoint/2010/main" val="3583695663"/>
+      </p:ext>
+    </p:extLst>
+  </p:cSld>
+  <p:clrMapOvr>
+    <a:masterClrMapping/>
+  </p:clrMapOvr>
+</p:notes>
+</file>
+
+<file path=ppt/notesSlides/notesSlide2.xml><?xml version="1.0" encoding="utf-8"?>
+<p:notes xmlns:a="http://schemas.openxmlformats.org/drawingml/2006/main" xmlns:r="http://schemas.openxmlformats.org/officeDocument/2006/relationships" xmlns:p="http://schemas.openxmlformats.org/presentationml/2006/main">
+  <p:cSld>
+    <p:spTree>
+      <p:nvGrpSpPr>
+        <p:cNvPr id="1" name=""/>
+        <p:cNvGrpSpPr/>
+        <p:nvPr/>
+      </p:nvGrpSpPr>
+      <p:grpSpPr>
+        <a:xfrm>
+          <a:off x="0" y="0"/>
+          <a:ext cx="0" cy="0"/>
+          <a:chOff x="0" y="0"/>
+          <a:chExt cx="0" cy="0"/>
+        </a:xfrm>
+      </p:grpSpPr>
+      <p:sp>
+        <p:nvSpPr>
+          <p:cNvPr id="2" name="Folienbildplatzhalter 1"/>
+          <p:cNvSpPr>
+            <a:spLocks noGrp="1" noRot="1" noChangeAspect="1"/>
+          </p:cNvSpPr>
+          <p:nvPr>
+            <p:ph type="sldImg"/>
+          </p:nvPr>
+        </p:nvSpPr>
+        <p:spPr/>
+      </p:sp>
+      <p:sp>
+        <p:nvSpPr>
+          <p:cNvPr id="3" name="Notizenplatzhalter 2"/>
+          <p:cNvSpPr>
+            <a:spLocks noGrp="1"/>
+          </p:cNvSpPr>
+          <p:nvPr>
+            <p:ph type="body" idx="1"/>
+          </p:nvPr>
+        </p:nvSpPr>
+        <p:spPr/>
+        <p:txBody>
+          <a:bodyPr/>
+          <a:lstStyle/>
+          <a:p>
+            <a:r>
+              <a:rPr lang="en-US" dirty="0" err="1"/>
+              <a:t>Ngram</a:t>
+            </a:r>
+            <a:r>
+              <a:rPr lang="en-US" dirty="0"/>
+              <a:t> Tokenizer =&gt; bad performance</a:t>
+            </a:r>
+          </a:p>
+        </p:txBody>
+      </p:sp>
+      <p:sp>
+        <p:nvSpPr>
+          <p:cNvPr id="4" name="Foliennummernplatzhalter 3"/>
+          <p:cNvSpPr>
+            <a:spLocks noGrp="1"/>
+          </p:cNvSpPr>
+          <p:nvPr>
+            <p:ph type="sldNum" sz="quarter" idx="10"/>
+          </p:nvPr>
+        </p:nvSpPr>
+        <p:spPr/>
+        <p:txBody>
+          <a:bodyPr/>
+          <a:lstStyle/>
+          <a:p>
+            <a:fld id="{1B8AAE5C-07F5-4A0A-836C-CDCB56A83837}" type="slidenum">
+              <a:rPr lang="en-US" smtClean="0"/>
+              <a:t>3</a:t>
+            </a:fld>
+            <a:endParaRPr lang="en-US"/>
+          </a:p>
+        </p:txBody>
+      </p:sp>
+    </p:spTree>
+    <p:extLst>
+      <p:ext uri="{BB962C8B-B14F-4D97-AF65-F5344CB8AC3E}">
+        <p14:creationId xmlns:p14="http://schemas.microsoft.com/office/powerpoint/2010/main" val="4188521271"/>
+      </p:ext>
+    </p:extLst>
+  </p:cSld>
+  <p:clrMapOvr>
+    <a:masterClrMapping/>
+  </p:clrMapOvr>
+</p:notes>
+</file>
+
+<file path=ppt/notesSlides/notesSlide3.xml><?xml version="1.0" encoding="utf-8"?>
+<p:notes xmlns:a="http://schemas.openxmlformats.org/drawingml/2006/main" xmlns:r="http://schemas.openxmlformats.org/officeDocument/2006/relationships" xmlns:p="http://schemas.openxmlformats.org/presentationml/2006/main">
+  <p:cSld>
+    <p:spTree>
+      <p:nvGrpSpPr>
+        <p:cNvPr id="1" name=""/>
+        <p:cNvGrpSpPr/>
+        <p:nvPr/>
+      </p:nvGrpSpPr>
+      <p:grpSpPr>
+        <a:xfrm>
+          <a:off x="0" y="0"/>
+          <a:ext cx="0" cy="0"/>
+          <a:chOff x="0" y="0"/>
+          <a:chExt cx="0" cy="0"/>
+        </a:xfrm>
+      </p:grpSpPr>
+      <p:sp>
+        <p:nvSpPr>
+          <p:cNvPr id="2" name="Folienbildplatzhalter 1"/>
+          <p:cNvSpPr>
+            <a:spLocks noGrp="1" noRot="1" noChangeAspect="1"/>
+          </p:cNvSpPr>
+          <p:nvPr>
+            <p:ph type="sldImg"/>
+          </p:nvPr>
+        </p:nvSpPr>
+        <p:spPr/>
+      </p:sp>
+      <p:sp>
+        <p:nvSpPr>
+          <p:cNvPr id="3" name="Notizenplatzhalter 2"/>
+          <p:cNvSpPr>
+            <a:spLocks noGrp="1"/>
+          </p:cNvSpPr>
+          <p:nvPr>
+            <p:ph type="body" idx="1"/>
+          </p:nvPr>
+        </p:nvSpPr>
+        <p:spPr/>
+        <p:txBody>
+          <a:bodyPr/>
+          <a:lstStyle/>
+          <a:p>
+            <a:endParaRPr lang="en-US" dirty="0"/>
+          </a:p>
+        </p:txBody>
+      </p:sp>
+      <p:sp>
+        <p:nvSpPr>
+          <p:cNvPr id="4" name="Foliennummernplatzhalter 3"/>
+          <p:cNvSpPr>
+            <a:spLocks noGrp="1"/>
+          </p:cNvSpPr>
+          <p:nvPr>
+            <p:ph type="sldNum" sz="quarter" idx="10"/>
+          </p:nvPr>
+        </p:nvSpPr>
+        <p:spPr/>
+        <p:txBody>
+          <a:bodyPr/>
+          <a:lstStyle/>
+          <a:p>
+            <a:fld id="{1B8AAE5C-07F5-4A0A-836C-CDCB56A83837}" type="slidenum">
+              <a:rPr lang="en-US" smtClean="0"/>
+              <a:t>4</a:t>
+            </a:fld>
+            <a:endParaRPr lang="en-US"/>
+          </a:p>
+        </p:txBody>
+      </p:sp>
+    </p:spTree>
+    <p:extLst>
+      <p:ext uri="{BB962C8B-B14F-4D97-AF65-F5344CB8AC3E}">
+        <p14:creationId xmlns:p14="http://schemas.microsoft.com/office/powerpoint/2010/main" val="1711314964"/>
+      </p:ext>
+    </p:extLst>
+  </p:cSld>
+  <p:clrMapOvr>
+    <a:masterClrMapping/>
+  </p:clrMapOvr>
+</p:notes>
+</file>
+
+<file path=ppt/notesSlides/notesSlide4.xml><?xml version="1.0" encoding="utf-8"?>
+<p:notes xmlns:a="http://schemas.openxmlformats.org/drawingml/2006/main" xmlns:r="http://schemas.openxmlformats.org/officeDocument/2006/relationships" xmlns:p="http://schemas.openxmlformats.org/presentationml/2006/main">
+  <p:cSld>
+    <p:spTree>
+      <p:nvGrpSpPr>
+        <p:cNvPr id="1" name=""/>
+        <p:cNvGrpSpPr/>
+        <p:nvPr/>
+      </p:nvGrpSpPr>
+      <p:grpSpPr>
+        <a:xfrm>
+          <a:off x="0" y="0"/>
+          <a:ext cx="0" cy="0"/>
+          <a:chOff x="0" y="0"/>
+          <a:chExt cx="0" cy="0"/>
+        </a:xfrm>
+      </p:grpSpPr>
+      <p:sp>
+        <p:nvSpPr>
+          <p:cNvPr id="2" name="Folienbildplatzhalter 1"/>
+          <p:cNvSpPr>
+            <a:spLocks noGrp="1" noRot="1" noChangeAspect="1"/>
+          </p:cNvSpPr>
+          <p:nvPr>
+            <p:ph type="sldImg"/>
+          </p:nvPr>
+        </p:nvSpPr>
+        <p:spPr/>
+      </p:sp>
+      <p:sp>
+        <p:nvSpPr>
+          <p:cNvPr id="3" name="Notizenplatzhalter 2"/>
+          <p:cNvSpPr>
+            <a:spLocks noGrp="1"/>
+          </p:cNvSpPr>
+          <p:nvPr>
+            <p:ph type="body" idx="1"/>
+          </p:nvPr>
+        </p:nvSpPr>
+        <p:spPr/>
+        <p:txBody>
+          <a:bodyPr/>
+          <a:lstStyle/>
+          <a:p>
+            <a:endParaRPr lang="en-US" dirty="0"/>
+          </a:p>
+        </p:txBody>
+      </p:sp>
+      <p:sp>
+        <p:nvSpPr>
+          <p:cNvPr id="4" name="Foliennummernplatzhalter 3"/>
+          <p:cNvSpPr>
+            <a:spLocks noGrp="1"/>
+          </p:cNvSpPr>
+          <p:nvPr>
+            <p:ph type="sldNum" sz="quarter" idx="10"/>
+          </p:nvPr>
+        </p:nvSpPr>
+        <p:spPr/>
+        <p:txBody>
+          <a:bodyPr/>
+          <a:lstStyle/>
+          <a:p>
+            <a:fld id="{1B8AAE5C-07F5-4A0A-836C-CDCB56A83837}" type="slidenum">
+              <a:rPr lang="en-US" smtClean="0"/>
+              <a:t>5</a:t>
+            </a:fld>
+            <a:endParaRPr lang="en-US"/>
+          </a:p>
+        </p:txBody>
+      </p:sp>
+    </p:spTree>
+    <p:extLst>
+      <p:ext uri="{BB962C8B-B14F-4D97-AF65-F5344CB8AC3E}">
+        <p14:creationId xmlns:p14="http://schemas.microsoft.com/office/powerpoint/2010/main" val="1641900836"/>
+      </p:ext>
+    </p:extLst>
+  </p:cSld>
+  <p:clrMapOvr>
+    <a:masterClrMapping/>
+  </p:clrMapOvr>
+</p:notes>
 </file>
 
 <file path=ppt/slideLayouts/slideLayout1.xml><?xml version="1.0" encoding="utf-8"?>
@@ -142,10 +877,9 @@
           <a:lstStyle/>
           <a:p>
             <a:r>
-              <a:rPr lang="de-DE" smtClean="0"/>
+              <a:rPr lang="de-DE"/>
               <a:t>Titelmasterformat durch Klicken bearbeiten</a:t>
             </a:r>
-            <a:endParaRPr lang="de-DE"/>
           </a:p>
         </p:txBody>
       </p:sp>
@@ -261,10 +995,9 @@
           </a:lstStyle>
           <a:p>
             <a:r>
-              <a:rPr lang="de-DE" smtClean="0"/>
+              <a:rPr lang="de-DE"/>
               <a:t>Formatvorlage des Untertitelmasters durch Klicken bearbeiten</a:t>
             </a:r>
-            <a:endParaRPr lang="de-DE"/>
           </a:p>
         </p:txBody>
       </p:sp>
@@ -285,7 +1018,7 @@
           <a:p>
             <a:fld id="{1BA50D42-C9CD-4801-B293-61D1F53EC57E}" type="datetimeFigureOut">
               <a:rPr lang="de-DE" smtClean="0"/>
-              <a:t>14.09.2006</a:t>
+              <a:t>03.01.2018</a:t>
             </a:fld>
             <a:endParaRPr lang="de-DE"/>
           </a:p>
@@ -374,10 +1107,9 @@
           <a:lstStyle/>
           <a:p>
             <a:r>
-              <a:rPr lang="de-DE" smtClean="0"/>
+              <a:rPr lang="de-DE"/>
               <a:t>Titelmasterformat durch Klicken bearbeiten</a:t>
             </a:r>
-            <a:endParaRPr lang="de-DE"/>
           </a:p>
         </p:txBody>
       </p:sp>
@@ -398,38 +1130,37 @@
           <a:p>
             <a:pPr lvl="0"/>
             <a:r>
-              <a:rPr lang="de-DE" smtClean="0"/>
+              <a:rPr lang="de-DE"/>
               <a:t>Textmasterformate durch Klicken bearbeiten</a:t>
             </a:r>
           </a:p>
           <a:p>
             <a:pPr lvl="1"/>
             <a:r>
-              <a:rPr lang="de-DE" smtClean="0"/>
+              <a:rPr lang="de-DE"/>
               <a:t>Zweite Ebene</a:t>
             </a:r>
           </a:p>
           <a:p>
             <a:pPr lvl="2"/>
             <a:r>
-              <a:rPr lang="de-DE" smtClean="0"/>
+              <a:rPr lang="de-DE"/>
               <a:t>Dritte Ebene</a:t>
             </a:r>
           </a:p>
           <a:p>
             <a:pPr lvl="3"/>
             <a:r>
-              <a:rPr lang="de-DE" smtClean="0"/>
+              <a:rPr lang="de-DE"/>
               <a:t>Vierte Ebene</a:t>
             </a:r>
           </a:p>
           <a:p>
             <a:pPr lvl="4"/>
             <a:r>
-              <a:rPr lang="de-DE" smtClean="0"/>
+              <a:rPr lang="de-DE"/>
               <a:t>Fünfte Ebene</a:t>
             </a:r>
-            <a:endParaRPr lang="de-DE"/>
           </a:p>
         </p:txBody>
       </p:sp>
@@ -450,7 +1181,7 @@
           <a:p>
             <a:fld id="{1BA50D42-C9CD-4801-B293-61D1F53EC57E}" type="datetimeFigureOut">
               <a:rPr lang="de-DE" smtClean="0"/>
-              <a:t>14.09.2006</a:t>
+              <a:t>03.01.2018</a:t>
             </a:fld>
             <a:endParaRPr lang="de-DE"/>
           </a:p>
@@ -544,10 +1275,9 @@
           <a:lstStyle/>
           <a:p>
             <a:r>
-              <a:rPr lang="de-DE" smtClean="0"/>
+              <a:rPr lang="de-DE"/>
               <a:t>Titel durch Klicken hinzufügen</a:t>
             </a:r>
-            <a:endParaRPr lang="de-DE"/>
           </a:p>
         </p:txBody>
       </p:sp>
@@ -573,38 +1303,37 @@
           <a:p>
             <a:pPr lvl="0"/>
             <a:r>
-              <a:rPr lang="de-DE" smtClean="0"/>
+              <a:rPr lang="de-DE"/>
               <a:t>Textmasterformate durch Klicken bearbeiten</a:t>
             </a:r>
           </a:p>
           <a:p>
             <a:pPr lvl="1"/>
             <a:r>
-              <a:rPr lang="de-DE" smtClean="0"/>
+              <a:rPr lang="de-DE"/>
               <a:t>Zweite Ebene</a:t>
             </a:r>
           </a:p>
           <a:p>
             <a:pPr lvl="2"/>
             <a:r>
-              <a:rPr lang="de-DE" smtClean="0"/>
+              <a:rPr lang="de-DE"/>
               <a:t>Dritte Ebene</a:t>
             </a:r>
           </a:p>
           <a:p>
             <a:pPr lvl="3"/>
             <a:r>
-              <a:rPr lang="de-DE" smtClean="0"/>
+              <a:rPr lang="de-DE"/>
               <a:t>Vierte Ebene</a:t>
             </a:r>
           </a:p>
           <a:p>
             <a:pPr lvl="4"/>
             <a:r>
-              <a:rPr lang="de-DE" smtClean="0"/>
+              <a:rPr lang="de-DE"/>
               <a:t>Fünfte Ebene</a:t>
             </a:r>
-            <a:endParaRPr lang="de-DE"/>
           </a:p>
         </p:txBody>
       </p:sp>
@@ -625,7 +1354,7 @@
           <a:p>
             <a:fld id="{1BA50D42-C9CD-4801-B293-61D1F53EC57E}" type="datetimeFigureOut">
               <a:rPr lang="de-DE" smtClean="0"/>
-              <a:t>14.09.2006</a:t>
+              <a:t>03.01.2018</a:t>
             </a:fld>
             <a:endParaRPr lang="de-DE"/>
           </a:p>
@@ -714,10 +1443,9 @@
           <a:lstStyle/>
           <a:p>
             <a:r>
-              <a:rPr lang="de-DE" smtClean="0"/>
+              <a:rPr lang="de-DE"/>
               <a:t>Titelmasterformat durch Klicken bearbeiten</a:t>
             </a:r>
-            <a:endParaRPr lang="de-DE"/>
           </a:p>
         </p:txBody>
       </p:sp>
@@ -738,38 +1466,37 @@
           <a:p>
             <a:pPr lvl="0"/>
             <a:r>
-              <a:rPr lang="de-DE" smtClean="0"/>
+              <a:rPr lang="de-DE"/>
               <a:t>Textmasterformate durch Klicken bearbeiten</a:t>
             </a:r>
           </a:p>
           <a:p>
             <a:pPr lvl="1"/>
             <a:r>
-              <a:rPr lang="de-DE" smtClean="0"/>
+              <a:rPr lang="de-DE"/>
               <a:t>Zweite Ebene</a:t>
             </a:r>
           </a:p>
           <a:p>
             <a:pPr lvl="2"/>
             <a:r>
-              <a:rPr lang="de-DE" smtClean="0"/>
+              <a:rPr lang="de-DE"/>
               <a:t>Dritte Ebene</a:t>
             </a:r>
           </a:p>
           <a:p>
             <a:pPr lvl="3"/>
             <a:r>
-              <a:rPr lang="de-DE" smtClean="0"/>
+              <a:rPr lang="de-DE"/>
               <a:t>Vierte Ebene</a:t>
             </a:r>
           </a:p>
           <a:p>
             <a:pPr lvl="4"/>
             <a:r>
-              <a:rPr lang="de-DE" smtClean="0"/>
+              <a:rPr lang="de-DE"/>
               <a:t>Fünfte Ebene</a:t>
             </a:r>
-            <a:endParaRPr lang="de-DE"/>
           </a:p>
         </p:txBody>
       </p:sp>
@@ -790,7 +1517,7 @@
           <a:p>
             <a:fld id="{1BA50D42-C9CD-4801-B293-61D1F53EC57E}" type="datetimeFigureOut">
               <a:rPr lang="de-DE" smtClean="0"/>
-              <a:t>14.09.2006</a:t>
+              <a:t>03.01.2018</a:t>
             </a:fld>
             <a:endParaRPr lang="de-DE"/>
           </a:p>
@@ -888,10 +1615,9 @@
           </a:lstStyle>
           <a:p>
             <a:r>
-              <a:rPr lang="de-DE" smtClean="0"/>
+              <a:rPr lang="de-DE"/>
               <a:t>Titelmasterformat durch Klicken bearbeiten</a:t>
             </a:r>
-            <a:endParaRPr lang="de-DE"/>
           </a:p>
         </p:txBody>
       </p:sp>
@@ -1008,7 +1734,7 @@
           <a:p>
             <a:pPr lvl="0"/>
             <a:r>
-              <a:rPr lang="de-DE" smtClean="0"/>
+              <a:rPr lang="de-DE"/>
               <a:t>Textmasterformate durch Klicken bearbeiten</a:t>
             </a:r>
           </a:p>
@@ -1031,7 +1757,7 @@
           <a:p>
             <a:fld id="{1BA50D42-C9CD-4801-B293-61D1F53EC57E}" type="datetimeFigureOut">
               <a:rPr lang="de-DE" smtClean="0"/>
-              <a:t>14.09.2006</a:t>
+              <a:t>03.01.2018</a:t>
             </a:fld>
             <a:endParaRPr lang="de-DE"/>
           </a:p>
@@ -1120,10 +1846,9 @@
           <a:lstStyle/>
           <a:p>
             <a:r>
-              <a:rPr lang="de-DE" smtClean="0"/>
+              <a:rPr lang="de-DE"/>
               <a:t>Titelmasterformat durch Klicken bearbeiten</a:t>
             </a:r>
-            <a:endParaRPr lang="de-DE"/>
           </a:p>
         </p:txBody>
       </p:sp>
@@ -1177,38 +1902,37 @@
           <a:p>
             <a:pPr lvl="0"/>
             <a:r>
-              <a:rPr lang="de-DE" smtClean="0"/>
+              <a:rPr lang="de-DE"/>
               <a:t>Textmasterformate durch Klicken bearbeiten</a:t>
             </a:r>
           </a:p>
           <a:p>
             <a:pPr lvl="1"/>
             <a:r>
-              <a:rPr lang="de-DE" smtClean="0"/>
+              <a:rPr lang="de-DE"/>
               <a:t>Zweite Ebene</a:t>
             </a:r>
           </a:p>
           <a:p>
             <a:pPr lvl="2"/>
             <a:r>
-              <a:rPr lang="de-DE" smtClean="0"/>
+              <a:rPr lang="de-DE"/>
               <a:t>Dritte Ebene</a:t>
             </a:r>
           </a:p>
           <a:p>
             <a:pPr lvl="3"/>
             <a:r>
-              <a:rPr lang="de-DE" smtClean="0"/>
+              <a:rPr lang="de-DE"/>
               <a:t>Vierte Ebene</a:t>
             </a:r>
           </a:p>
           <a:p>
             <a:pPr lvl="4"/>
             <a:r>
-              <a:rPr lang="de-DE" smtClean="0"/>
+              <a:rPr lang="de-DE"/>
               <a:t>Fünfte Ebene</a:t>
             </a:r>
-            <a:endParaRPr lang="de-DE"/>
           </a:p>
         </p:txBody>
       </p:sp>
@@ -1262,38 +1986,37 @@
           <a:p>
             <a:pPr lvl="0"/>
             <a:r>
-              <a:rPr lang="de-DE" smtClean="0"/>
+              <a:rPr lang="de-DE"/>
               <a:t>Textmasterformate durch Klicken bearbeiten</a:t>
             </a:r>
           </a:p>
           <a:p>
             <a:pPr lvl="1"/>
             <a:r>
-              <a:rPr lang="de-DE" smtClean="0"/>
+              <a:rPr lang="de-DE"/>
               <a:t>Zweite Ebene</a:t>
             </a:r>
           </a:p>
           <a:p>
             <a:pPr lvl="2"/>
             <a:r>
-              <a:rPr lang="de-DE" smtClean="0"/>
+              <a:rPr lang="de-DE"/>
               <a:t>Dritte Ebene</a:t>
             </a:r>
           </a:p>
           <a:p>
             <a:pPr lvl="3"/>
             <a:r>
-              <a:rPr lang="de-DE" smtClean="0"/>
+              <a:rPr lang="de-DE"/>
               <a:t>Vierte Ebene</a:t>
             </a:r>
           </a:p>
           <a:p>
             <a:pPr lvl="4"/>
             <a:r>
-              <a:rPr lang="de-DE" smtClean="0"/>
+              <a:rPr lang="de-DE"/>
               <a:t>Fünfte Ebene</a:t>
             </a:r>
-            <a:endParaRPr lang="de-DE"/>
           </a:p>
         </p:txBody>
       </p:sp>
@@ -1314,7 +2037,7 @@
           <a:p>
             <a:fld id="{1BA50D42-C9CD-4801-B293-61D1F53EC57E}" type="datetimeFigureOut">
               <a:rPr lang="de-DE" smtClean="0"/>
-              <a:t>14.09.2006</a:t>
+              <a:t>03.01.2018</a:t>
             </a:fld>
             <a:endParaRPr lang="de-DE"/>
           </a:p>
@@ -1407,10 +2130,9 @@
           </a:lstStyle>
           <a:p>
             <a:r>
-              <a:rPr lang="de-DE" smtClean="0"/>
+              <a:rPr lang="de-DE"/>
               <a:t>Titelmasterformat durch Klicken bearbeiten</a:t>
             </a:r>
-            <a:endParaRPr lang="de-DE"/>
           </a:p>
         </p:txBody>
       </p:sp>
@@ -1473,7 +2195,7 @@
           <a:p>
             <a:pPr lvl="0"/>
             <a:r>
-              <a:rPr lang="de-DE" smtClean="0"/>
+              <a:rPr lang="de-DE"/>
               <a:t>Textmasterformate durch Klicken bearbeiten</a:t>
             </a:r>
           </a:p>
@@ -1529,38 +2251,37 @@
           <a:p>
             <a:pPr lvl="0"/>
             <a:r>
-              <a:rPr lang="de-DE" smtClean="0"/>
+              <a:rPr lang="de-DE"/>
               <a:t>Textmasterformate durch Klicken bearbeiten</a:t>
             </a:r>
           </a:p>
           <a:p>
             <a:pPr lvl="1"/>
             <a:r>
-              <a:rPr lang="de-DE" smtClean="0"/>
+              <a:rPr lang="de-DE"/>
               <a:t>Zweite Ebene</a:t>
             </a:r>
           </a:p>
           <a:p>
             <a:pPr lvl="2"/>
             <a:r>
-              <a:rPr lang="de-DE" smtClean="0"/>
+              <a:rPr lang="de-DE"/>
               <a:t>Dritte Ebene</a:t>
             </a:r>
           </a:p>
           <a:p>
             <a:pPr lvl="3"/>
             <a:r>
-              <a:rPr lang="de-DE" smtClean="0"/>
+              <a:rPr lang="de-DE"/>
               <a:t>Vierte Ebene</a:t>
             </a:r>
           </a:p>
           <a:p>
             <a:pPr lvl="4"/>
             <a:r>
-              <a:rPr lang="de-DE" smtClean="0"/>
+              <a:rPr lang="de-DE"/>
               <a:t>Fünfte Ebene</a:t>
             </a:r>
-            <a:endParaRPr lang="de-DE"/>
           </a:p>
         </p:txBody>
       </p:sp>
@@ -1623,7 +2344,7 @@
           <a:p>
             <a:pPr lvl="0"/>
             <a:r>
-              <a:rPr lang="de-DE" smtClean="0"/>
+              <a:rPr lang="de-DE"/>
               <a:t>Textmasterformate durch Klicken bearbeiten</a:t>
             </a:r>
           </a:p>
@@ -1679,38 +2400,37 @@
           <a:p>
             <a:pPr lvl="0"/>
             <a:r>
-              <a:rPr lang="de-DE" smtClean="0"/>
+              <a:rPr lang="de-DE"/>
               <a:t>Textmasterformate durch Klicken bearbeiten</a:t>
             </a:r>
           </a:p>
           <a:p>
             <a:pPr lvl="1"/>
             <a:r>
-              <a:rPr lang="de-DE" smtClean="0"/>
+              <a:rPr lang="de-DE"/>
               <a:t>Zweite Ebene</a:t>
             </a:r>
           </a:p>
           <a:p>
             <a:pPr lvl="2"/>
             <a:r>
-              <a:rPr lang="de-DE" smtClean="0"/>
+              <a:rPr lang="de-DE"/>
               <a:t>Dritte Ebene</a:t>
             </a:r>
           </a:p>
           <a:p>
             <a:pPr lvl="3"/>
             <a:r>
-              <a:rPr lang="de-DE" smtClean="0"/>
+              <a:rPr lang="de-DE"/>
               <a:t>Vierte Ebene</a:t>
             </a:r>
           </a:p>
           <a:p>
             <a:pPr lvl="4"/>
             <a:r>
-              <a:rPr lang="de-DE" smtClean="0"/>
+              <a:rPr lang="de-DE"/>
               <a:t>Fünfte Ebene</a:t>
             </a:r>
-            <a:endParaRPr lang="de-DE"/>
           </a:p>
         </p:txBody>
       </p:sp>
@@ -1731,7 +2451,7 @@
           <a:p>
             <a:fld id="{1BA50D42-C9CD-4801-B293-61D1F53EC57E}" type="datetimeFigureOut">
               <a:rPr lang="de-DE" smtClean="0"/>
-              <a:t>14.09.2006</a:t>
+              <a:t>03.01.2018</a:t>
             </a:fld>
             <a:endParaRPr lang="de-DE"/>
           </a:p>
@@ -1820,10 +2540,9 @@
           <a:lstStyle/>
           <a:p>
             <a:r>
-              <a:rPr lang="de-DE" smtClean="0"/>
+              <a:rPr lang="de-DE"/>
               <a:t>Titelmasterformat durch Klicken bearbeiten</a:t>
             </a:r>
-            <a:endParaRPr lang="de-DE"/>
           </a:p>
         </p:txBody>
       </p:sp>
@@ -1844,7 +2563,7 @@
           <a:p>
             <a:fld id="{1BA50D42-C9CD-4801-B293-61D1F53EC57E}" type="datetimeFigureOut">
               <a:rPr lang="de-DE" smtClean="0"/>
-              <a:t>14.09.2006</a:t>
+              <a:t>03.01.2018</a:t>
             </a:fld>
             <a:endParaRPr lang="de-DE"/>
           </a:p>
@@ -1934,7 +2653,7 @@
           <a:p>
             <a:fld id="{1BA50D42-C9CD-4801-B293-61D1F53EC57E}" type="datetimeFigureOut">
               <a:rPr lang="de-DE" smtClean="0"/>
-              <a:t>14.09.2006</a:t>
+              <a:t>03.01.2018</a:t>
             </a:fld>
             <a:endParaRPr lang="de-DE"/>
           </a:p>
@@ -2032,10 +2751,9 @@
           </a:lstStyle>
           <a:p>
             <a:r>
-              <a:rPr lang="de-DE" smtClean="0"/>
+              <a:rPr lang="de-DE"/>
               <a:t>Titelmasterformat durch Klicken bearbeiten</a:t>
             </a:r>
-            <a:endParaRPr lang="de-DE"/>
           </a:p>
         </p:txBody>
       </p:sp>
@@ -2089,38 +2807,37 @@
           <a:p>
             <a:pPr lvl="0"/>
             <a:r>
-              <a:rPr lang="de-DE" smtClean="0"/>
+              <a:rPr lang="de-DE"/>
               <a:t>Textmasterformate durch Klicken bearbeiten</a:t>
             </a:r>
           </a:p>
           <a:p>
             <a:pPr lvl="1"/>
             <a:r>
-              <a:rPr lang="de-DE" smtClean="0"/>
+              <a:rPr lang="de-DE"/>
               <a:t>Zweite Ebene</a:t>
             </a:r>
           </a:p>
           <a:p>
             <a:pPr lvl="2"/>
             <a:r>
-              <a:rPr lang="de-DE" smtClean="0"/>
+              <a:rPr lang="de-DE"/>
               <a:t>Dritte Ebene</a:t>
             </a:r>
           </a:p>
           <a:p>
             <a:pPr lvl="3"/>
             <a:r>
-              <a:rPr lang="de-DE" smtClean="0"/>
+              <a:rPr lang="de-DE"/>
               <a:t>Vierte Ebene</a:t>
             </a:r>
           </a:p>
           <a:p>
             <a:pPr lvl="4"/>
             <a:r>
-              <a:rPr lang="de-DE" smtClean="0"/>
+              <a:rPr lang="de-DE"/>
               <a:t>Fünfte Ebene</a:t>
             </a:r>
-            <a:endParaRPr lang="de-DE"/>
           </a:p>
         </p:txBody>
       </p:sp>
@@ -2183,7 +2900,7 @@
           <a:p>
             <a:pPr lvl="0"/>
             <a:r>
-              <a:rPr lang="de-DE" smtClean="0"/>
+              <a:rPr lang="de-DE"/>
               <a:t>Textmasterformate durch Klicken bearbeiten</a:t>
             </a:r>
           </a:p>
@@ -2206,7 +2923,7 @@
           <a:p>
             <a:fld id="{1BA50D42-C9CD-4801-B293-61D1F53EC57E}" type="datetimeFigureOut">
               <a:rPr lang="de-DE" smtClean="0"/>
-              <a:t>14.09.2006</a:t>
+              <a:t>03.01.2018</a:t>
             </a:fld>
             <a:endParaRPr lang="de-DE"/>
           </a:p>
@@ -2304,10 +3021,9 @@
           </a:lstStyle>
           <a:p>
             <a:r>
-              <a:rPr lang="de-DE" smtClean="0"/>
+              <a:rPr lang="de-DE"/>
               <a:t>Titelmasterformat durch Klicken bearbeiten</a:t>
             </a:r>
-            <a:endParaRPr lang="de-DE"/>
           </a:p>
         </p:txBody>
       </p:sp>
@@ -2431,7 +3147,7 @@
           <a:p>
             <a:pPr lvl="0"/>
             <a:r>
-              <a:rPr lang="de-DE" smtClean="0"/>
+              <a:rPr lang="de-DE"/>
               <a:t>Textmasterformate durch Klicken bearbeiten</a:t>
             </a:r>
           </a:p>
@@ -2454,7 +3170,7 @@
           <a:p>
             <a:fld id="{1BA50D42-C9CD-4801-B293-61D1F53EC57E}" type="datetimeFigureOut">
               <a:rPr lang="de-DE" smtClean="0"/>
-              <a:t>14.09.2006</a:t>
+              <a:t>03.01.2018</a:t>
             </a:fld>
             <a:endParaRPr lang="de-DE"/>
           </a:p>
@@ -2558,10 +3274,9 @@
           <a:lstStyle/>
           <a:p>
             <a:r>
-              <a:rPr lang="de-DE" smtClean="0"/>
+              <a:rPr lang="de-DE"/>
               <a:t>Titelmasterformat durch Klicken bearbeiten</a:t>
             </a:r>
-            <a:endParaRPr lang="de-DE"/>
           </a:p>
         </p:txBody>
       </p:sp>
@@ -2592,38 +3307,37 @@
           <a:p>
             <a:pPr lvl="0"/>
             <a:r>
-              <a:rPr lang="de-DE" smtClean="0"/>
+              <a:rPr lang="de-DE"/>
               <a:t>Textmasterformate durch Klicken bearbeiten</a:t>
             </a:r>
           </a:p>
           <a:p>
             <a:pPr lvl="1"/>
             <a:r>
-              <a:rPr lang="de-DE" smtClean="0"/>
+              <a:rPr lang="de-DE"/>
               <a:t>Zweite Ebene</a:t>
             </a:r>
           </a:p>
           <a:p>
             <a:pPr lvl="2"/>
             <a:r>
-              <a:rPr lang="de-DE" smtClean="0"/>
+              <a:rPr lang="de-DE"/>
               <a:t>Dritte Ebene</a:t>
             </a:r>
           </a:p>
           <a:p>
             <a:pPr lvl="3"/>
             <a:r>
-              <a:rPr lang="de-DE" smtClean="0"/>
+              <a:rPr lang="de-DE"/>
               <a:t>Vierte Ebene</a:t>
             </a:r>
           </a:p>
           <a:p>
             <a:pPr lvl="4"/>
             <a:r>
-              <a:rPr lang="de-DE" smtClean="0"/>
+              <a:rPr lang="de-DE"/>
               <a:t>Fünfte Ebene</a:t>
             </a:r>
-            <a:endParaRPr lang="de-DE"/>
           </a:p>
         </p:txBody>
       </p:sp>
@@ -2662,7 +3376,7 @@
           <a:p>
             <a:fld id="{1BA50D42-C9CD-4801-B293-61D1F53EC57E}" type="datetimeFigureOut">
               <a:rPr lang="de-DE" smtClean="0"/>
-              <a:t>14.09.2006</a:t>
+              <a:t>03.01.2018</a:t>
             </a:fld>
             <a:endParaRPr lang="de-DE"/>
           </a:p>
@@ -3015,15 +3729,1136 @@
 </p:sldMaster>
 </file>
 
+<file path=ppt/slides/slide1.xml><?xml version="1.0" encoding="utf-8"?>
+<p:sld xmlns:a="http://schemas.openxmlformats.org/drawingml/2006/main" xmlns:r="http://schemas.openxmlformats.org/officeDocument/2006/relationships" xmlns:p="http://schemas.openxmlformats.org/presentationml/2006/main">
+  <p:cSld>
+    <p:spTree>
+      <p:nvGrpSpPr>
+        <p:cNvPr id="1" name=""/>
+        <p:cNvGrpSpPr/>
+        <p:nvPr/>
+      </p:nvGrpSpPr>
+      <p:grpSpPr>
+        <a:xfrm>
+          <a:off x="0" y="0"/>
+          <a:ext cx="0" cy="0"/>
+          <a:chOff x="0" y="0"/>
+          <a:chExt cx="0" cy="0"/>
+        </a:xfrm>
+      </p:grpSpPr>
+      <p:sp>
+        <p:nvSpPr>
+          <p:cNvPr id="2" name="Titel 1">
+            <a:extLst>
+              <a:ext uri="{FF2B5EF4-FFF2-40B4-BE49-F238E27FC236}">
+                <a16:creationId xmlns:a16="http://schemas.microsoft.com/office/drawing/2014/main" id="{03F619E5-5DB6-4920-A410-11CCD82D2338}"/>
+              </a:ext>
+            </a:extLst>
+          </p:cNvPr>
+          <p:cNvSpPr>
+            <a:spLocks noGrp="1"/>
+          </p:cNvSpPr>
+          <p:nvPr>
+            <p:ph type="ctrTitle"/>
+          </p:nvPr>
+        </p:nvSpPr>
+        <p:spPr>
+          <a:xfrm>
+            <a:off x="685800" y="1844824"/>
+            <a:ext cx="7772400" cy="1470025"/>
+          </a:xfrm>
+        </p:spPr>
+        <p:txBody>
+          <a:bodyPr/>
+          <a:lstStyle/>
+          <a:p>
+            <a:r>
+              <a:rPr lang="en-US" dirty="0"/>
+              <a:t>Sentiment Analysis</a:t>
+            </a:r>
+            <a:br>
+              <a:rPr lang="en-US" dirty="0"/>
+            </a:br>
+            <a:r>
+              <a:rPr lang="en-US" dirty="0"/>
+              <a:t>BTI7535</a:t>
+            </a:r>
+          </a:p>
+        </p:txBody>
+      </p:sp>
+      <p:sp>
+        <p:nvSpPr>
+          <p:cNvPr id="3" name="Untertitel 2">
+            <a:extLst>
+              <a:ext uri="{FF2B5EF4-FFF2-40B4-BE49-F238E27FC236}">
+                <a16:creationId xmlns:a16="http://schemas.microsoft.com/office/drawing/2014/main" id="{E602C963-F786-4557-905C-736F1CCB7CD2}"/>
+              </a:ext>
+            </a:extLst>
+          </p:cNvPr>
+          <p:cNvSpPr>
+            <a:spLocks noGrp="1"/>
+          </p:cNvSpPr>
+          <p:nvPr>
+            <p:ph type="subTitle" idx="1"/>
+          </p:nvPr>
+        </p:nvSpPr>
+        <p:spPr/>
+        <p:txBody>
+          <a:bodyPr>
+            <a:normAutofit/>
+          </a:bodyPr>
+          <a:lstStyle/>
+          <a:p>
+            <a:r>
+              <a:rPr lang="en-US" sz="2400" dirty="0"/>
+              <a:t>Elisa Schnabel</a:t>
+            </a:r>
+          </a:p>
+          <a:p>
+            <a:r>
+              <a:rPr lang="en-US" sz="2400" dirty="0"/>
+              <a:t>Anna Schenk</a:t>
+            </a:r>
+          </a:p>
+          <a:p>
+            <a:r>
+              <a:rPr lang="en-US" sz="2400" dirty="0"/>
+              <a:t>Mathias Rudolf</a:t>
+            </a:r>
+          </a:p>
+        </p:txBody>
+      </p:sp>
+    </p:spTree>
+    <p:extLst>
+      <p:ext uri="{BB962C8B-B14F-4D97-AF65-F5344CB8AC3E}">
+        <p14:creationId xmlns:p14="http://schemas.microsoft.com/office/powerpoint/2010/main" val="2939623001"/>
+      </p:ext>
+    </p:extLst>
+  </p:cSld>
+  <p:clrMapOvr>
+    <a:masterClrMapping/>
+  </p:clrMapOvr>
+</p:sld>
+</file>
+
+<file path=ppt/slides/slide2.xml><?xml version="1.0" encoding="utf-8"?>
+<p:sld xmlns:a="http://schemas.openxmlformats.org/drawingml/2006/main" xmlns:r="http://schemas.openxmlformats.org/officeDocument/2006/relationships" xmlns:p="http://schemas.openxmlformats.org/presentationml/2006/main">
+  <p:cSld>
+    <p:spTree>
+      <p:nvGrpSpPr>
+        <p:cNvPr id="1" name=""/>
+        <p:cNvGrpSpPr/>
+        <p:nvPr/>
+      </p:nvGrpSpPr>
+      <p:grpSpPr>
+        <a:xfrm>
+          <a:off x="0" y="0"/>
+          <a:ext cx="0" cy="0"/>
+          <a:chOff x="0" y="0"/>
+          <a:chExt cx="0" cy="0"/>
+        </a:xfrm>
+      </p:grpSpPr>
+      <p:sp>
+        <p:nvSpPr>
+          <p:cNvPr id="2" name="Titel 1">
+            <a:extLst>
+              <a:ext uri="{FF2B5EF4-FFF2-40B4-BE49-F238E27FC236}">
+                <a16:creationId xmlns:a16="http://schemas.microsoft.com/office/drawing/2014/main" id="{39211465-8447-4F3D-997C-F566B64F494B}"/>
+              </a:ext>
+            </a:extLst>
+          </p:cNvPr>
+          <p:cNvSpPr>
+            <a:spLocks noGrp="1"/>
+          </p:cNvSpPr>
+          <p:nvPr>
+            <p:ph type="title"/>
+          </p:nvPr>
+        </p:nvSpPr>
+        <p:spPr/>
+        <p:txBody>
+          <a:bodyPr/>
+          <a:lstStyle/>
+          <a:p>
+            <a:r>
+              <a:rPr lang="en-US" dirty="0"/>
+              <a:t>Baseline</a:t>
+            </a:r>
+          </a:p>
+        </p:txBody>
+      </p:sp>
+      <p:sp>
+        <p:nvSpPr>
+          <p:cNvPr id="3" name="Inhaltsplatzhalter 2">
+            <a:extLst>
+              <a:ext uri="{FF2B5EF4-FFF2-40B4-BE49-F238E27FC236}">
+                <a16:creationId xmlns:a16="http://schemas.microsoft.com/office/drawing/2014/main" id="{92EA9C9B-01AE-4420-845B-1CA2A3B63ED7}"/>
+              </a:ext>
+            </a:extLst>
+          </p:cNvPr>
+          <p:cNvSpPr>
+            <a:spLocks noGrp="1"/>
+          </p:cNvSpPr>
+          <p:nvPr>
+            <p:ph idx="1"/>
+          </p:nvPr>
+        </p:nvSpPr>
+        <p:spPr/>
+        <p:txBody>
+          <a:bodyPr/>
+          <a:lstStyle/>
+          <a:p>
+            <a:r>
+              <a:rPr lang="en-US" dirty="0"/>
+              <a:t>Count Sentiment words</a:t>
+            </a:r>
+          </a:p>
+          <a:p>
+            <a:r>
+              <a:rPr lang="en-US" dirty="0"/>
+              <a:t>Accuracy: 64 %</a:t>
+            </a:r>
+          </a:p>
+        </p:txBody>
+      </p:sp>
+    </p:spTree>
+    <p:extLst>
+      <p:ext uri="{BB962C8B-B14F-4D97-AF65-F5344CB8AC3E}">
+        <p14:creationId xmlns:p14="http://schemas.microsoft.com/office/powerpoint/2010/main" val="2949889486"/>
+      </p:ext>
+    </p:extLst>
+  </p:cSld>
+  <p:clrMapOvr>
+    <a:masterClrMapping/>
+  </p:clrMapOvr>
+</p:sld>
+</file>
+
+<file path=ppt/slides/slide3.xml><?xml version="1.0" encoding="utf-8"?>
+<p:sld xmlns:a="http://schemas.openxmlformats.org/drawingml/2006/main" xmlns:r="http://schemas.openxmlformats.org/officeDocument/2006/relationships" xmlns:p="http://schemas.openxmlformats.org/presentationml/2006/main">
+  <p:cSld>
+    <p:spTree>
+      <p:nvGrpSpPr>
+        <p:cNvPr id="1" name=""/>
+        <p:cNvGrpSpPr/>
+        <p:nvPr/>
+      </p:nvGrpSpPr>
+      <p:grpSpPr>
+        <a:xfrm>
+          <a:off x="0" y="0"/>
+          <a:ext cx="0" cy="0"/>
+          <a:chOff x="0" y="0"/>
+          <a:chExt cx="0" cy="0"/>
+        </a:xfrm>
+      </p:grpSpPr>
+      <p:sp>
+        <p:nvSpPr>
+          <p:cNvPr id="2" name="Titel 1">
+            <a:extLst>
+              <a:ext uri="{FF2B5EF4-FFF2-40B4-BE49-F238E27FC236}">
+                <a16:creationId xmlns:a16="http://schemas.microsoft.com/office/drawing/2014/main" id="{5DE45912-DCF6-44D7-8381-F101FC7AC6A5}"/>
+              </a:ext>
+            </a:extLst>
+          </p:cNvPr>
+          <p:cNvSpPr>
+            <a:spLocks noGrp="1"/>
+          </p:cNvSpPr>
+          <p:nvPr>
+            <p:ph type="title"/>
+          </p:nvPr>
+        </p:nvSpPr>
+        <p:spPr/>
+        <p:txBody>
+          <a:bodyPr/>
+          <a:lstStyle/>
+          <a:p>
+            <a:r>
+              <a:rPr lang="en-US" dirty="0"/>
+              <a:t>Naïve Bayes</a:t>
+            </a:r>
+          </a:p>
+        </p:txBody>
+      </p:sp>
+      <p:graphicFrame>
+        <p:nvGraphicFramePr>
+          <p:cNvPr id="4" name="Inhaltsplatzhalter 3">
+            <a:extLst>
+              <a:ext uri="{FF2B5EF4-FFF2-40B4-BE49-F238E27FC236}">
+                <a16:creationId xmlns:a16="http://schemas.microsoft.com/office/drawing/2014/main" id="{783F464F-0261-4433-90A8-22356A21DF02}"/>
+              </a:ext>
+            </a:extLst>
+          </p:cNvPr>
+          <p:cNvGraphicFramePr>
+            <a:graphicFrameLocks noGrp="1"/>
+          </p:cNvGraphicFramePr>
+          <p:nvPr>
+            <p:ph idx="1"/>
+            <p:extLst>
+              <p:ext uri="{D42A27DB-BD31-4B8C-83A1-F6EECF244321}">
+                <p14:modId xmlns:p14="http://schemas.microsoft.com/office/powerpoint/2010/main" val="4287589053"/>
+              </p:ext>
+            </p:extLst>
+          </p:nvPr>
+        </p:nvGraphicFramePr>
+        <p:xfrm>
+          <a:off x="457200" y="1600200"/>
+          <a:ext cx="8229600" cy="3108960"/>
+        </p:xfrm>
+        <a:graphic>
+          <a:graphicData uri="http://schemas.openxmlformats.org/drawingml/2006/table">
+            <a:tbl>
+              <a:tblPr firstRow="1" bandRow="1">
+                <a:tableStyleId>{5940675A-B579-460E-94D1-54222C63F5DA}</a:tableStyleId>
+              </a:tblPr>
+              <a:tblGrid>
+                <a:gridCol w="6347048">
+                  <a:extLst>
+                    <a:ext uri="{9D8B030D-6E8A-4147-A177-3AD203B41FA5}">
+                      <a16:colId xmlns:a16="http://schemas.microsoft.com/office/drawing/2014/main" val="1503052177"/>
+                    </a:ext>
+                  </a:extLst>
+                </a:gridCol>
+                <a:gridCol w="1882552">
+                  <a:extLst>
+                    <a:ext uri="{9D8B030D-6E8A-4147-A177-3AD203B41FA5}">
+                      <a16:colId xmlns:a16="http://schemas.microsoft.com/office/drawing/2014/main" val="2339267281"/>
+                    </a:ext>
+                  </a:extLst>
+                </a:gridCol>
+              </a:tblGrid>
+              <a:tr h="370840">
+                <a:tc>
+                  <a:txBody>
+                    <a:bodyPr/>
+                    <a:lstStyle/>
+                    <a:p>
+                      <a:r>
+                        <a:rPr lang="en-US" sz="2800" b="1" dirty="0"/>
+                        <a:t>Feature</a:t>
+                      </a:r>
+                    </a:p>
+                  </a:txBody>
+                  <a:tcPr/>
+                </a:tc>
+                <a:tc>
+                  <a:txBody>
+                    <a:bodyPr/>
+                    <a:lstStyle/>
+                    <a:p>
+                      <a:r>
+                        <a:rPr lang="en-US" sz="2800" b="1" dirty="0"/>
+                        <a:t>Accuracy</a:t>
+                      </a:r>
+                    </a:p>
+                  </a:txBody>
+                  <a:tcPr/>
+                </a:tc>
+                <a:extLst>
+                  <a:ext uri="{0D108BD9-81ED-4DB2-BD59-A6C34878D82A}">
+                    <a16:rowId xmlns:a16="http://schemas.microsoft.com/office/drawing/2014/main" val="1482844405"/>
+                  </a:ext>
+                </a:extLst>
+              </a:tr>
+              <a:tr h="370840">
+                <a:tc>
+                  <a:txBody>
+                    <a:bodyPr/>
+                    <a:lstStyle/>
+                    <a:p>
+                      <a:r>
+                        <a:rPr lang="en-US" sz="2800" dirty="0" err="1"/>
+                        <a:t>StringToWordVector</a:t>
+                      </a:r>
+                      <a:endParaRPr lang="en-US" sz="2800" dirty="0"/>
+                    </a:p>
+                  </a:txBody>
+                  <a:tcPr/>
+                </a:tc>
+                <a:tc>
+                  <a:txBody>
+                    <a:bodyPr/>
+                    <a:lstStyle/>
+                    <a:p>
+                      <a:pPr algn="l"/>
+                      <a:r>
+                        <a:rPr lang="en-US" sz="2800" dirty="0"/>
+                        <a:t>80.26%</a:t>
+                      </a:r>
+                    </a:p>
+                  </a:txBody>
+                  <a:tcPr/>
+                </a:tc>
+                <a:extLst>
+                  <a:ext uri="{0D108BD9-81ED-4DB2-BD59-A6C34878D82A}">
+                    <a16:rowId xmlns:a16="http://schemas.microsoft.com/office/drawing/2014/main" val="151074451"/>
+                  </a:ext>
+                </a:extLst>
+              </a:tr>
+              <a:tr h="370840">
+                <a:tc>
+                  <a:txBody>
+                    <a:bodyPr/>
+                    <a:lstStyle/>
+                    <a:p>
+                      <a:r>
+                        <a:rPr lang="en-US" sz="2800" dirty="0"/>
+                        <a:t>+ </a:t>
+                      </a:r>
+                      <a:r>
+                        <a:rPr lang="en-US" sz="2800" dirty="0" err="1"/>
+                        <a:t>LovinsStemmer</a:t>
+                      </a:r>
+                      <a:endParaRPr lang="en-US" sz="2800" dirty="0"/>
+                    </a:p>
+                  </a:txBody>
+                  <a:tcPr/>
+                </a:tc>
+                <a:tc>
+                  <a:txBody>
+                    <a:bodyPr/>
+                    <a:lstStyle/>
+                    <a:p>
+                      <a:pPr algn="l"/>
+                      <a:r>
+                        <a:rPr lang="en-US" sz="2800" dirty="0">
+                          <a:solidFill>
+                            <a:srgbClr val="FF0000"/>
+                          </a:solidFill>
+                        </a:rPr>
+                        <a:t>76.95%</a:t>
+                      </a:r>
+                    </a:p>
+                  </a:txBody>
+                  <a:tcPr/>
+                </a:tc>
+                <a:extLst>
+                  <a:ext uri="{0D108BD9-81ED-4DB2-BD59-A6C34878D82A}">
+                    <a16:rowId xmlns:a16="http://schemas.microsoft.com/office/drawing/2014/main" val="1455069126"/>
+                  </a:ext>
+                </a:extLst>
+              </a:tr>
+              <a:tr h="370840">
+                <a:tc>
+                  <a:txBody>
+                    <a:bodyPr/>
+                    <a:lstStyle/>
+                    <a:p>
+                      <a:r>
+                        <a:rPr lang="en-US" sz="2800" dirty="0"/>
+                        <a:t>+ TF IDF Transform</a:t>
+                      </a:r>
+                    </a:p>
+                  </a:txBody>
+                  <a:tcPr/>
+                </a:tc>
+                <a:tc>
+                  <a:txBody>
+                    <a:bodyPr/>
+                    <a:lstStyle/>
+                    <a:p>
+                      <a:r>
+                        <a:rPr lang="en-US" sz="2800" dirty="0"/>
+                        <a:t>80.26%</a:t>
+                      </a:r>
+                    </a:p>
+                  </a:txBody>
+                  <a:tcPr/>
+                </a:tc>
+                <a:extLst>
+                  <a:ext uri="{0D108BD9-81ED-4DB2-BD59-A6C34878D82A}">
+                    <a16:rowId xmlns:a16="http://schemas.microsoft.com/office/drawing/2014/main" val="428628165"/>
+                  </a:ext>
+                </a:extLst>
+              </a:tr>
+              <a:tr h="370840">
+                <a:tc>
+                  <a:txBody>
+                    <a:bodyPr/>
+                    <a:lstStyle/>
+                    <a:p>
+                      <a:r>
+                        <a:rPr lang="en-US" sz="2800" dirty="0"/>
+                        <a:t>+ </a:t>
+                      </a:r>
+                      <a:r>
+                        <a:rPr lang="en-US" sz="2800" dirty="0" err="1"/>
+                        <a:t>Ngram</a:t>
+                      </a:r>
+                      <a:r>
+                        <a:rPr lang="en-US" sz="2800" dirty="0"/>
+                        <a:t> Tokenizer (3)</a:t>
+                      </a:r>
+                    </a:p>
+                  </a:txBody>
+                  <a:tcPr/>
+                </a:tc>
+                <a:tc>
+                  <a:txBody>
+                    <a:bodyPr/>
+                    <a:lstStyle/>
+                    <a:p>
+                      <a:r>
+                        <a:rPr lang="en-US" sz="2800" dirty="0">
+                          <a:solidFill>
+                            <a:srgbClr val="FF0000"/>
+                          </a:solidFill>
+                        </a:rPr>
+                        <a:t>79.33%</a:t>
+                      </a:r>
+                    </a:p>
+                  </a:txBody>
+                  <a:tcPr/>
+                </a:tc>
+                <a:extLst>
+                  <a:ext uri="{0D108BD9-81ED-4DB2-BD59-A6C34878D82A}">
+                    <a16:rowId xmlns:a16="http://schemas.microsoft.com/office/drawing/2014/main" val="2785655776"/>
+                  </a:ext>
+                </a:extLst>
+              </a:tr>
+              <a:tr h="370840">
+                <a:tc>
+                  <a:txBody>
+                    <a:bodyPr/>
+                    <a:lstStyle/>
+                    <a:p>
+                      <a:r>
+                        <a:rPr lang="en-US" sz="2800" dirty="0"/>
+                        <a:t>+ Bigram Tokenizer</a:t>
+                      </a:r>
+                    </a:p>
+                  </a:txBody>
+                  <a:tcPr/>
+                </a:tc>
+                <a:tc>
+                  <a:txBody>
+                    <a:bodyPr/>
+                    <a:lstStyle/>
+                    <a:p>
+                      <a:r>
+                        <a:rPr lang="en-US" sz="2800" dirty="0">
+                          <a:solidFill>
+                            <a:srgbClr val="FF0000"/>
+                          </a:solidFill>
+                        </a:rPr>
+                        <a:t>78.85%</a:t>
+                      </a:r>
+                    </a:p>
+                  </a:txBody>
+                  <a:tcPr/>
+                </a:tc>
+                <a:extLst>
+                  <a:ext uri="{0D108BD9-81ED-4DB2-BD59-A6C34878D82A}">
+                    <a16:rowId xmlns:a16="http://schemas.microsoft.com/office/drawing/2014/main" val="1544958649"/>
+                  </a:ext>
+                </a:extLst>
+              </a:tr>
+            </a:tbl>
+          </a:graphicData>
+        </a:graphic>
+      </p:graphicFrame>
+    </p:spTree>
+    <p:extLst>
+      <p:ext uri="{BB962C8B-B14F-4D97-AF65-F5344CB8AC3E}">
+        <p14:creationId xmlns:p14="http://schemas.microsoft.com/office/powerpoint/2010/main" val="197503952"/>
+      </p:ext>
+    </p:extLst>
+  </p:cSld>
+  <p:clrMapOvr>
+    <a:masterClrMapping/>
+  </p:clrMapOvr>
+</p:sld>
+</file>
+
+<file path=ppt/slides/slide4.xml><?xml version="1.0" encoding="utf-8"?>
+<p:sld xmlns:a="http://schemas.openxmlformats.org/drawingml/2006/main" xmlns:r="http://schemas.openxmlformats.org/officeDocument/2006/relationships" xmlns:p="http://schemas.openxmlformats.org/presentationml/2006/main">
+  <p:cSld>
+    <p:spTree>
+      <p:nvGrpSpPr>
+        <p:cNvPr id="1" name=""/>
+        <p:cNvGrpSpPr/>
+        <p:nvPr/>
+      </p:nvGrpSpPr>
+      <p:grpSpPr>
+        <a:xfrm>
+          <a:off x="0" y="0"/>
+          <a:ext cx="0" cy="0"/>
+          <a:chOff x="0" y="0"/>
+          <a:chExt cx="0" cy="0"/>
+        </a:xfrm>
+      </p:grpSpPr>
+      <p:sp>
+        <p:nvSpPr>
+          <p:cNvPr id="2" name="Titel 1">
+            <a:extLst>
+              <a:ext uri="{FF2B5EF4-FFF2-40B4-BE49-F238E27FC236}">
+                <a16:creationId xmlns:a16="http://schemas.microsoft.com/office/drawing/2014/main" id="{F850CBCA-7CA1-4932-89C2-0B5308B56479}"/>
+              </a:ext>
+            </a:extLst>
+          </p:cNvPr>
+          <p:cNvSpPr>
+            <a:spLocks noGrp="1"/>
+          </p:cNvSpPr>
+          <p:nvPr>
+            <p:ph type="title"/>
+          </p:nvPr>
+        </p:nvSpPr>
+        <p:spPr/>
+        <p:txBody>
+          <a:bodyPr/>
+          <a:lstStyle/>
+          <a:p>
+            <a:r>
+              <a:rPr lang="en-US" dirty="0"/>
+              <a:t>Our Features</a:t>
+            </a:r>
+          </a:p>
+        </p:txBody>
+      </p:sp>
+      <p:graphicFrame>
+        <p:nvGraphicFramePr>
+          <p:cNvPr id="5" name="Inhaltsplatzhalter 4">
+            <a:extLst>
+              <a:ext uri="{FF2B5EF4-FFF2-40B4-BE49-F238E27FC236}">
+                <a16:creationId xmlns:a16="http://schemas.microsoft.com/office/drawing/2014/main" id="{2AFDB156-D2FB-4AD3-84B2-E192B477F16B}"/>
+              </a:ext>
+            </a:extLst>
+          </p:cNvPr>
+          <p:cNvGraphicFramePr>
+            <a:graphicFrameLocks noGrp="1"/>
+          </p:cNvGraphicFramePr>
+          <p:nvPr>
+            <p:ph idx="1"/>
+            <p:extLst>
+              <p:ext uri="{D42A27DB-BD31-4B8C-83A1-F6EECF244321}">
+                <p14:modId xmlns:p14="http://schemas.microsoft.com/office/powerpoint/2010/main" val="1031263849"/>
+              </p:ext>
+            </p:extLst>
+          </p:nvPr>
+        </p:nvGraphicFramePr>
+        <p:xfrm>
+          <a:off x="457200" y="1484784"/>
+          <a:ext cx="8229600" cy="4876800"/>
+        </p:xfrm>
+        <a:graphic>
+          <a:graphicData uri="http://schemas.openxmlformats.org/drawingml/2006/table">
+            <a:tbl>
+              <a:tblPr firstRow="1" bandRow="1">
+                <a:tableStyleId>{5940675A-B579-460E-94D1-54222C63F5DA}</a:tableStyleId>
+              </a:tblPr>
+              <a:tblGrid>
+                <a:gridCol w="5987008">
+                  <a:extLst>
+                    <a:ext uri="{9D8B030D-6E8A-4147-A177-3AD203B41FA5}">
+                      <a16:colId xmlns:a16="http://schemas.microsoft.com/office/drawing/2014/main" val="380425911"/>
+                    </a:ext>
+                  </a:extLst>
+                </a:gridCol>
+                <a:gridCol w="2242592">
+                  <a:extLst>
+                    <a:ext uri="{9D8B030D-6E8A-4147-A177-3AD203B41FA5}">
+                      <a16:colId xmlns:a16="http://schemas.microsoft.com/office/drawing/2014/main" val="3392016740"/>
+                    </a:ext>
+                  </a:extLst>
+                </a:gridCol>
+              </a:tblGrid>
+              <a:tr h="447740">
+                <a:tc>
+                  <a:txBody>
+                    <a:bodyPr/>
+                    <a:lstStyle/>
+                    <a:p>
+                      <a:r>
+                        <a:rPr lang="en-US" sz="2600" b="1" dirty="0"/>
+                        <a:t>Feature</a:t>
+                      </a:r>
+                    </a:p>
+                  </a:txBody>
+                  <a:tcPr/>
+                </a:tc>
+                <a:tc>
+                  <a:txBody>
+                    <a:bodyPr/>
+                    <a:lstStyle/>
+                    <a:p>
+                      <a:r>
+                        <a:rPr lang="en-US" sz="2600" b="1" dirty="0"/>
+                        <a:t>Accuracy</a:t>
+                      </a:r>
+                    </a:p>
+                  </a:txBody>
+                  <a:tcPr/>
+                </a:tc>
+                <a:extLst>
+                  <a:ext uri="{0D108BD9-81ED-4DB2-BD59-A6C34878D82A}">
+                    <a16:rowId xmlns:a16="http://schemas.microsoft.com/office/drawing/2014/main" val="215077303"/>
+                  </a:ext>
+                </a:extLst>
+              </a:tr>
+              <a:tr h="447740">
+                <a:tc>
+                  <a:txBody>
+                    <a:bodyPr/>
+                    <a:lstStyle/>
+                    <a:p>
+                      <a:r>
+                        <a:rPr lang="en-US" sz="2600" dirty="0"/>
+                        <a:t>+ Negation (don’t =&gt; NOT_ …)</a:t>
+                      </a:r>
+                    </a:p>
+                  </a:txBody>
+                  <a:tcPr/>
+                </a:tc>
+                <a:tc>
+                  <a:txBody>
+                    <a:bodyPr/>
+                    <a:lstStyle/>
+                    <a:p>
+                      <a:r>
+                        <a:rPr lang="en-US" sz="2600" dirty="0">
+                          <a:solidFill>
+                            <a:srgbClr val="FF0000"/>
+                          </a:solidFill>
+                        </a:rPr>
+                        <a:t>79.74%</a:t>
+                      </a:r>
+                    </a:p>
+                  </a:txBody>
+                  <a:tcPr/>
+                </a:tc>
+                <a:extLst>
+                  <a:ext uri="{0D108BD9-81ED-4DB2-BD59-A6C34878D82A}">
+                    <a16:rowId xmlns:a16="http://schemas.microsoft.com/office/drawing/2014/main" val="2649821046"/>
+                  </a:ext>
+                </a:extLst>
+              </a:tr>
+              <a:tr h="447740">
+                <a:tc>
+                  <a:txBody>
+                    <a:bodyPr/>
+                    <a:lstStyle/>
+                    <a:p>
+                      <a:r>
+                        <a:rPr lang="en-US" sz="2600" dirty="0"/>
+                        <a:t>+ Rating (7/10, …)</a:t>
+                      </a:r>
+                    </a:p>
+                  </a:txBody>
+                  <a:tcPr/>
+                </a:tc>
+                <a:tc>
+                  <a:txBody>
+                    <a:bodyPr/>
+                    <a:lstStyle/>
+                    <a:p>
+                      <a:r>
+                        <a:rPr lang="en-US" sz="2600" dirty="0">
+                          <a:solidFill>
+                            <a:srgbClr val="FF0000"/>
+                          </a:solidFill>
+                        </a:rPr>
+                        <a:t>80.17%</a:t>
+                      </a:r>
+                    </a:p>
+                  </a:txBody>
+                  <a:tcPr/>
+                </a:tc>
+                <a:extLst>
+                  <a:ext uri="{0D108BD9-81ED-4DB2-BD59-A6C34878D82A}">
+                    <a16:rowId xmlns:a16="http://schemas.microsoft.com/office/drawing/2014/main" val="3458137211"/>
+                  </a:ext>
+                </a:extLst>
+              </a:tr>
+              <a:tr h="447740">
+                <a:tc>
+                  <a:txBody>
+                    <a:bodyPr/>
+                    <a:lstStyle/>
+                    <a:p>
+                      <a:r>
+                        <a:rPr lang="en-US" sz="2600" dirty="0"/>
+                        <a:t>+ Character </a:t>
+                      </a:r>
+                      <a:r>
+                        <a:rPr lang="en-US" sz="2600" dirty="0" err="1"/>
+                        <a:t>occurence</a:t>
+                      </a:r>
+                      <a:r>
+                        <a:rPr lang="en-US" sz="2600" dirty="0"/>
+                        <a:t> (!, ?)</a:t>
+                      </a:r>
+                    </a:p>
+                  </a:txBody>
+                  <a:tcPr/>
+                </a:tc>
+                <a:tc>
+                  <a:txBody>
+                    <a:bodyPr/>
+                    <a:lstStyle/>
+                    <a:p>
+                      <a:r>
+                        <a:rPr lang="en-US" sz="2600" dirty="0">
+                          <a:solidFill>
+                            <a:schemeClr val="tx1"/>
+                          </a:solidFill>
+                        </a:rPr>
+                        <a:t>80.31%</a:t>
+                      </a:r>
+                    </a:p>
+                  </a:txBody>
+                  <a:tcPr/>
+                </a:tc>
+                <a:extLst>
+                  <a:ext uri="{0D108BD9-81ED-4DB2-BD59-A6C34878D82A}">
+                    <a16:rowId xmlns:a16="http://schemas.microsoft.com/office/drawing/2014/main" val="1928463067"/>
+                  </a:ext>
+                </a:extLst>
+              </a:tr>
+              <a:tr h="447740">
+                <a:tc>
+                  <a:txBody>
+                    <a:bodyPr/>
+                    <a:lstStyle/>
+                    <a:p>
+                      <a:r>
+                        <a:rPr lang="en-US" sz="2600" dirty="0"/>
+                        <a:t>+ Character repetition count (!, ?)</a:t>
+                      </a:r>
+                    </a:p>
+                  </a:txBody>
+                  <a:tcPr/>
+                </a:tc>
+                <a:tc>
+                  <a:txBody>
+                    <a:bodyPr/>
+                    <a:lstStyle/>
+                    <a:p>
+                      <a:r>
+                        <a:rPr lang="en-US" sz="2600" dirty="0"/>
+                        <a:t>80.31%</a:t>
+                      </a:r>
+                    </a:p>
+                  </a:txBody>
+                  <a:tcPr/>
+                </a:tc>
+                <a:extLst>
+                  <a:ext uri="{0D108BD9-81ED-4DB2-BD59-A6C34878D82A}">
+                    <a16:rowId xmlns:a16="http://schemas.microsoft.com/office/drawing/2014/main" val="2898640488"/>
+                  </a:ext>
+                </a:extLst>
+              </a:tr>
+              <a:tr h="447740">
+                <a:tc>
+                  <a:txBody>
+                    <a:bodyPr/>
+                    <a:lstStyle/>
+                    <a:p>
+                      <a:r>
+                        <a:rPr lang="en-US" sz="2600" dirty="0"/>
+                        <a:t>+ Intense words count(very, never, …)</a:t>
+                      </a:r>
+                    </a:p>
+                  </a:txBody>
+                  <a:tcPr/>
+                </a:tc>
+                <a:tc>
+                  <a:txBody>
+                    <a:bodyPr/>
+                    <a:lstStyle/>
+                    <a:p>
+                      <a:r>
+                        <a:rPr lang="en-US" sz="2600" dirty="0"/>
+                        <a:t>80.62%</a:t>
+                      </a:r>
+                    </a:p>
+                  </a:txBody>
+                  <a:tcPr/>
+                </a:tc>
+                <a:extLst>
+                  <a:ext uri="{0D108BD9-81ED-4DB2-BD59-A6C34878D82A}">
+                    <a16:rowId xmlns:a16="http://schemas.microsoft.com/office/drawing/2014/main" val="3596340615"/>
+                  </a:ext>
+                </a:extLst>
+              </a:tr>
+              <a:tr h="447740">
+                <a:tc>
+                  <a:txBody>
+                    <a:bodyPr/>
+                    <a:lstStyle/>
+                    <a:p>
+                      <a:r>
+                        <a:rPr lang="en-US" sz="2600" dirty="0"/>
+                        <a:t>+ Bad Words Good Words count</a:t>
+                      </a:r>
+                    </a:p>
+                  </a:txBody>
+                  <a:tcPr/>
+                </a:tc>
+                <a:tc>
+                  <a:txBody>
+                    <a:bodyPr/>
+                    <a:lstStyle/>
+                    <a:p>
+                      <a:r>
+                        <a:rPr lang="en-US" sz="2600" dirty="0"/>
+                        <a:t>81.09%</a:t>
+                      </a:r>
+                    </a:p>
+                  </a:txBody>
+                  <a:tcPr/>
+                </a:tc>
+                <a:extLst>
+                  <a:ext uri="{0D108BD9-81ED-4DB2-BD59-A6C34878D82A}">
+                    <a16:rowId xmlns:a16="http://schemas.microsoft.com/office/drawing/2014/main" val="202906537"/>
+                  </a:ext>
+                </a:extLst>
+              </a:tr>
+              <a:tr h="447740">
+                <a:tc>
+                  <a:txBody>
+                    <a:bodyPr/>
+                    <a:lstStyle/>
+                    <a:p>
+                      <a:r>
+                        <a:rPr lang="en-US" sz="2600" dirty="0"/>
+                        <a:t>+ Remove Stop words</a:t>
+                      </a:r>
+                    </a:p>
+                  </a:txBody>
+                  <a:tcPr/>
+                </a:tc>
+                <a:tc>
+                  <a:txBody>
+                    <a:bodyPr/>
+                    <a:lstStyle/>
+                    <a:p>
+                      <a:r>
+                        <a:rPr lang="en-US" sz="2600" dirty="0">
+                          <a:solidFill>
+                            <a:srgbClr val="FF0000"/>
+                          </a:solidFill>
+                        </a:rPr>
+                        <a:t>80.94%</a:t>
+                      </a:r>
+                    </a:p>
+                  </a:txBody>
+                  <a:tcPr/>
+                </a:tc>
+                <a:extLst>
+                  <a:ext uri="{0D108BD9-81ED-4DB2-BD59-A6C34878D82A}">
+                    <a16:rowId xmlns:a16="http://schemas.microsoft.com/office/drawing/2014/main" val="61151984"/>
+                  </a:ext>
+                </a:extLst>
+              </a:tr>
+              <a:tr h="447740">
+                <a:tc>
+                  <a:txBody>
+                    <a:bodyPr/>
+                    <a:lstStyle/>
+                    <a:p>
+                      <a:r>
+                        <a:rPr lang="en-US" sz="2600" dirty="0"/>
+                        <a:t>+ Increase word weight (last 20%)</a:t>
+                      </a:r>
+                    </a:p>
+                  </a:txBody>
+                  <a:tcPr/>
+                </a:tc>
+                <a:tc>
+                  <a:txBody>
+                    <a:bodyPr/>
+                    <a:lstStyle/>
+                    <a:p>
+                      <a:r>
+                        <a:rPr lang="en-US" sz="2600" dirty="0"/>
+                        <a:t>81.95%</a:t>
+                      </a:r>
+                    </a:p>
+                  </a:txBody>
+                  <a:tcPr/>
+                </a:tc>
+                <a:extLst>
+                  <a:ext uri="{0D108BD9-81ED-4DB2-BD59-A6C34878D82A}">
+                    <a16:rowId xmlns:a16="http://schemas.microsoft.com/office/drawing/2014/main" val="2753123675"/>
+                  </a:ext>
+                </a:extLst>
+              </a:tr>
+              <a:tr h="447740">
+                <a:tc>
+                  <a:txBody>
+                    <a:bodyPr/>
+                    <a:lstStyle/>
+                    <a:p>
+                      <a:r>
+                        <a:rPr lang="en-US" sz="2600" b="0" dirty="0">
+                          <a:solidFill>
+                            <a:schemeClr val="tx1"/>
+                          </a:solidFill>
+                        </a:rPr>
+                        <a:t>+ Most informative words</a:t>
+                      </a:r>
+                    </a:p>
+                  </a:txBody>
+                  <a:tcPr/>
+                </a:tc>
+                <a:tc>
+                  <a:txBody>
+                    <a:bodyPr/>
+                    <a:lstStyle/>
+                    <a:p>
+                      <a:r>
+                        <a:rPr lang="en-US" sz="2600" b="1" dirty="0">
+                          <a:solidFill>
+                            <a:srgbClr val="00B050"/>
+                          </a:solidFill>
+                        </a:rPr>
+                        <a:t>90.55%</a:t>
+                      </a:r>
+                    </a:p>
+                  </a:txBody>
+                  <a:tcPr/>
+                </a:tc>
+                <a:extLst>
+                  <a:ext uri="{0D108BD9-81ED-4DB2-BD59-A6C34878D82A}">
+                    <a16:rowId xmlns:a16="http://schemas.microsoft.com/office/drawing/2014/main" val="287410126"/>
+                  </a:ext>
+                </a:extLst>
+              </a:tr>
+            </a:tbl>
+          </a:graphicData>
+        </a:graphic>
+      </p:graphicFrame>
+    </p:spTree>
+    <p:extLst>
+      <p:ext uri="{BB962C8B-B14F-4D97-AF65-F5344CB8AC3E}">
+        <p14:creationId xmlns:p14="http://schemas.microsoft.com/office/powerpoint/2010/main" val="2895823714"/>
+      </p:ext>
+    </p:extLst>
+  </p:cSld>
+  <p:clrMapOvr>
+    <a:masterClrMapping/>
+  </p:clrMapOvr>
+</p:sld>
+</file>
+
+<file path=ppt/slides/slide5.xml><?xml version="1.0" encoding="utf-8"?>
+<p:sld xmlns:a="http://schemas.openxmlformats.org/drawingml/2006/main" xmlns:r="http://schemas.openxmlformats.org/officeDocument/2006/relationships" xmlns:p="http://schemas.openxmlformats.org/presentationml/2006/main">
+  <p:cSld>
+    <p:spTree>
+      <p:nvGrpSpPr>
+        <p:cNvPr id="1" name=""/>
+        <p:cNvGrpSpPr/>
+        <p:nvPr/>
+      </p:nvGrpSpPr>
+      <p:grpSpPr>
+        <a:xfrm>
+          <a:off x="0" y="0"/>
+          <a:ext cx="0" cy="0"/>
+          <a:chOff x="0" y="0"/>
+          <a:chExt cx="0" cy="0"/>
+        </a:xfrm>
+      </p:grpSpPr>
+      <p:sp>
+        <p:nvSpPr>
+          <p:cNvPr id="2" name="Titel 1">
+            <a:extLst>
+              <a:ext uri="{FF2B5EF4-FFF2-40B4-BE49-F238E27FC236}">
+                <a16:creationId xmlns:a16="http://schemas.microsoft.com/office/drawing/2014/main" id="{C9534794-9A22-4F2C-B5F0-85B62A85607C}"/>
+              </a:ext>
+            </a:extLst>
+          </p:cNvPr>
+          <p:cNvSpPr>
+            <a:spLocks noGrp="1"/>
+          </p:cNvSpPr>
+          <p:nvPr>
+            <p:ph type="title"/>
+          </p:nvPr>
+        </p:nvSpPr>
+        <p:spPr/>
+        <p:txBody>
+          <a:bodyPr/>
+          <a:lstStyle/>
+          <a:p>
+            <a:r>
+              <a:rPr lang="en-US" dirty="0"/>
+              <a:t>Lessons learned</a:t>
+            </a:r>
+          </a:p>
+        </p:txBody>
+      </p:sp>
+      <p:sp>
+        <p:nvSpPr>
+          <p:cNvPr id="3" name="Inhaltsplatzhalter 2">
+            <a:extLst>
+              <a:ext uri="{FF2B5EF4-FFF2-40B4-BE49-F238E27FC236}">
+                <a16:creationId xmlns:a16="http://schemas.microsoft.com/office/drawing/2014/main" id="{8AECCB90-3C71-4179-90B6-3B694CB7EB8F}"/>
+              </a:ext>
+            </a:extLst>
+          </p:cNvPr>
+          <p:cNvSpPr>
+            <a:spLocks noGrp="1"/>
+          </p:cNvSpPr>
+          <p:nvPr>
+            <p:ph idx="1"/>
+          </p:nvPr>
+        </p:nvSpPr>
+        <p:spPr/>
+        <p:txBody>
+          <a:bodyPr/>
+          <a:lstStyle/>
+          <a:p>
+            <a:r>
+              <a:rPr lang="en-US" dirty="0"/>
+              <a:t>Aroused our interest</a:t>
+            </a:r>
+          </a:p>
+          <a:p>
+            <a:r>
+              <a:rPr lang="en-US" dirty="0"/>
+              <a:t>Much effort, but interesting</a:t>
+            </a:r>
+          </a:p>
+          <a:p>
+            <a:r>
+              <a:rPr lang="en-US" dirty="0"/>
+              <a:t>Difficult to find good features</a:t>
+            </a:r>
+          </a:p>
+          <a:p>
+            <a:r>
+              <a:rPr lang="en-US" dirty="0"/>
+              <a:t>Weka performance </a:t>
+            </a:r>
+            <a:r>
+              <a:rPr lang="en-US" dirty="0">
+                <a:sym typeface="Wingdings" panose="05000000000000000000" pitchFamily="2" charset="2"/>
+              </a:rPr>
+              <a:t></a:t>
+            </a:r>
+            <a:endParaRPr lang="en-US" dirty="0"/>
+          </a:p>
+        </p:txBody>
+      </p:sp>
+    </p:spTree>
+    <p:extLst>
+      <p:ext uri="{BB962C8B-B14F-4D97-AF65-F5344CB8AC3E}">
+        <p14:creationId xmlns:p14="http://schemas.microsoft.com/office/powerpoint/2010/main" val="2964229617"/>
+      </p:ext>
+    </p:extLst>
+  </p:cSld>
+  <p:clrMapOvr>
+    <a:masterClrMapping/>
+  </p:clrMapOvr>
+</p:sld>
+</file>
+
 <file path=ppt/theme/theme1.xml><?xml version="1.0" encoding="utf-8"?>
 <a:theme xmlns:a="http://schemas.openxmlformats.org/drawingml/2006/main" name="Larissa-Design">
   <a:themeElements>
     <a:clrScheme name="Larissa">
       <a:dk1>
-        <a:sysClr val="windowText"/>
+        <a:sysClr val="windowText" lastClr="000000"/>
       </a:dk1>
       <a:lt1>
-        <a:sysClr val="window"/>
+        <a:sysClr val="window" lastClr="FFFFFF"/>
       </a:lt1>
       <a:dk2>
         <a:srgbClr val="1F497D"/>
@@ -3296,4 +5131,299 @@
   <a:objectDefaults/>
   <a:extraClrSchemeLst/>
 </a:theme>
+</file>
+
+<file path=ppt/theme/theme2.xml><?xml version="1.0" encoding="utf-8"?>
+<a:theme xmlns:a="http://schemas.openxmlformats.org/drawingml/2006/main" name="Office">
+  <a:themeElements>
+    <a:clrScheme name="Office">
+      <a:dk1>
+        <a:sysClr val="windowText" lastClr="000000"/>
+      </a:dk1>
+      <a:lt1>
+        <a:sysClr val="window" lastClr="FFFFFF"/>
+      </a:lt1>
+      <a:dk2>
+        <a:srgbClr val="44546A"/>
+      </a:dk2>
+      <a:lt2>
+        <a:srgbClr val="E7E6E6"/>
+      </a:lt2>
+      <a:accent1>
+        <a:srgbClr val="4472C4"/>
+      </a:accent1>
+      <a:accent2>
+        <a:srgbClr val="ED7D31"/>
+      </a:accent2>
+      <a:accent3>
+        <a:srgbClr val="A5A5A5"/>
+      </a:accent3>
+      <a:accent4>
+        <a:srgbClr val="FFC000"/>
+      </a:accent4>
+      <a:accent5>
+        <a:srgbClr val="5B9BD5"/>
+      </a:accent5>
+      <a:accent6>
+        <a:srgbClr val="70AD47"/>
+      </a:accent6>
+      <a:hlink>
+        <a:srgbClr val="0563C1"/>
+      </a:hlink>
+      <a:folHlink>
+        <a:srgbClr val="954F72"/>
+      </a:folHlink>
+    </a:clrScheme>
+    <a:fontScheme name="Office">
+      <a:majorFont>
+        <a:latin typeface="Calibri Light" panose="020F0302020204030204"/>
+        <a:ea typeface=""/>
+        <a:cs typeface=""/>
+        <a:font script="Jpan" typeface="游ゴシック Light"/>
+        <a:font script="Hang" typeface="맑은 고딕"/>
+        <a:font script="Hans" typeface="等线 Light"/>
+        <a:font script="Hant" typeface="新細明體"/>
+        <a:font script="Arab" typeface="Times New Roman"/>
+        <a:font script="Hebr" typeface="Times New Roman"/>
+        <a:font script="Thai" typeface="Angsana New"/>
+        <a:font script="Ethi" typeface="Nyala"/>
+        <a:font script="Beng" typeface="Vrinda"/>
+        <a:font script="Gujr" typeface="Shruti"/>
+        <a:font script="Khmr" typeface="MoolBoran"/>
+        <a:font script="Knda" typeface="Tunga"/>
+        <a:font script="Guru" typeface="Raavi"/>
+        <a:font script="Cans" typeface="Euphemia"/>
+        <a:font script="Cher" typeface="Plantagenet Cherokee"/>
+        <a:font script="Yiii" typeface="Microsoft Yi Baiti"/>
+        <a:font script="Tibt" typeface="Microsoft Himalaya"/>
+        <a:font script="Thaa" typeface="MV Boli"/>
+        <a:font script="Deva" typeface="Mangal"/>
+        <a:font script="Telu" typeface="Gautami"/>
+        <a:font script="Taml" typeface="Latha"/>
+        <a:font script="Syrc" typeface="Estrangelo Edessa"/>
+        <a:font script="Orya" typeface="Kalinga"/>
+        <a:font script="Mlym" typeface="Kartika"/>
+        <a:font script="Laoo" typeface="DokChampa"/>
+        <a:font script="Sinh" typeface="Iskoola Pota"/>
+        <a:font script="Mong" typeface="Mongolian Baiti"/>
+        <a:font script="Viet" typeface="Times New Roman"/>
+        <a:font script="Uigh" typeface="Microsoft Uighur"/>
+        <a:font script="Geor" typeface="Sylfaen"/>
+        <a:font script="Armn" typeface="Arial"/>
+        <a:font script="Bugi" typeface="Leelawadee UI"/>
+        <a:font script="Bopo" typeface="Microsoft JhengHei"/>
+        <a:font script="Java" typeface="Javanese Text"/>
+        <a:font script="Lisu" typeface="Segoe UI"/>
+        <a:font script="Mymr" typeface="Myanmar Text"/>
+        <a:font script="Nkoo" typeface="Ebrima"/>
+        <a:font script="Olck" typeface="Nirmala UI"/>
+        <a:font script="Osma" typeface="Ebrima"/>
+        <a:font script="Phag" typeface="Phagspa"/>
+        <a:font script="Syrn" typeface="Estrangelo Edessa"/>
+        <a:font script="Syrj" typeface="Estrangelo Edessa"/>
+        <a:font script="Syre" typeface="Estrangelo Edessa"/>
+        <a:font script="Sora" typeface="Nirmala UI"/>
+        <a:font script="Tale" typeface="Microsoft Tai Le"/>
+        <a:font script="Talu" typeface="Microsoft New Tai Lue"/>
+        <a:font script="Tfng" typeface="Ebrima"/>
+      </a:majorFont>
+      <a:minorFont>
+        <a:latin typeface="Calibri" panose="020F0502020204030204"/>
+        <a:ea typeface=""/>
+        <a:cs typeface=""/>
+        <a:font script="Jpan" typeface="游ゴシック"/>
+        <a:font script="Hang" typeface="맑은 고딕"/>
+        <a:font script="Hans" typeface="等线"/>
+        <a:font script="Hant" typeface="新細明體"/>
+        <a:font script="Arab" typeface="Arial"/>
+        <a:font script="Hebr" typeface="Arial"/>
+        <a:font script="Thai" typeface="Cordia New"/>
+        <a:font script="Ethi" typeface="Nyala"/>
+        <a:font script="Beng" typeface="Vrinda"/>
+        <a:font script="Gujr" typeface="Shruti"/>
+        <a:font script="Khmr" typeface="DaunPenh"/>
+        <a:font script="Knda" typeface="Tunga"/>
+        <a:font script="Guru" typeface="Raavi"/>
+        <a:font script="Cans" typeface="Euphemia"/>
+        <a:font script="Cher" typeface="Plantagenet Cherokee"/>
+        <a:font script="Yiii" typeface="Microsoft Yi Baiti"/>
+        <a:font script="Tibt" typeface="Microsoft Himalaya"/>
+        <a:font script="Thaa" typeface="MV Boli"/>
+        <a:font script="Deva" typeface="Mangal"/>
+        <a:font script="Telu" typeface="Gautami"/>
+        <a:font script="Taml" typeface="Latha"/>
+        <a:font script="Syrc" typeface="Estrangelo Edessa"/>
+        <a:font script="Orya" typeface="Kalinga"/>
+        <a:font script="Mlym" typeface="Kartika"/>
+        <a:font script="Laoo" typeface="DokChampa"/>
+        <a:font script="Sinh" typeface="Iskoola Pota"/>
+        <a:font script="Mong" typeface="Mongolian Baiti"/>
+        <a:font script="Viet" typeface="Arial"/>
+        <a:font script="Uigh" typeface="Microsoft Uighur"/>
+        <a:font script="Geor" typeface="Sylfaen"/>
+        <a:font script="Armn" typeface="Arial"/>
+        <a:font script="Bugi" typeface="Leelawadee UI"/>
+        <a:font script="Bopo" typeface="Microsoft JhengHei"/>
+        <a:font script="Java" typeface="Javanese Text"/>
+        <a:font script="Lisu" typeface="Segoe UI"/>
+        <a:font script="Mymr" typeface="Myanmar Text"/>
+        <a:font script="Nkoo" typeface="Ebrima"/>
+        <a:font script="Olck" typeface="Nirmala UI"/>
+        <a:font script="Osma" typeface="Ebrima"/>
+        <a:font script="Phag" typeface="Phagspa"/>
+        <a:font script="Syrn" typeface="Estrangelo Edessa"/>
+        <a:font script="Syrj" typeface="Estrangelo Edessa"/>
+        <a:font script="Syre" typeface="Estrangelo Edessa"/>
+        <a:font script="Sora" typeface="Nirmala UI"/>
+        <a:font script="Tale" typeface="Microsoft Tai Le"/>
+        <a:font script="Talu" typeface="Microsoft New Tai Lue"/>
+        <a:font script="Tfng" typeface="Ebrima"/>
+      </a:minorFont>
+    </a:fontScheme>
+    <a:fmtScheme name="Office">
+      <a:fillStyleLst>
+        <a:solidFill>
+          <a:schemeClr val="phClr"/>
+        </a:solidFill>
+        <a:gradFill rotWithShape="1">
+          <a:gsLst>
+            <a:gs pos="0">
+              <a:schemeClr val="phClr">
+                <a:lumMod val="110000"/>
+                <a:satMod val="105000"/>
+                <a:tint val="67000"/>
+              </a:schemeClr>
+            </a:gs>
+            <a:gs pos="50000">
+              <a:schemeClr val="phClr">
+                <a:lumMod val="105000"/>
+                <a:satMod val="103000"/>
+                <a:tint val="73000"/>
+              </a:schemeClr>
+            </a:gs>
+            <a:gs pos="100000">
+              <a:schemeClr val="phClr">
+                <a:lumMod val="105000"/>
+                <a:satMod val="109000"/>
+                <a:tint val="81000"/>
+              </a:schemeClr>
+            </a:gs>
+          </a:gsLst>
+          <a:lin ang="5400000" scaled="0"/>
+        </a:gradFill>
+        <a:gradFill rotWithShape="1">
+          <a:gsLst>
+            <a:gs pos="0">
+              <a:schemeClr val="phClr">
+                <a:satMod val="103000"/>
+                <a:lumMod val="102000"/>
+                <a:tint val="94000"/>
+              </a:schemeClr>
+            </a:gs>
+            <a:gs pos="50000">
+              <a:schemeClr val="phClr">
+                <a:satMod val="110000"/>
+                <a:lumMod val="100000"/>
+                <a:shade val="100000"/>
+              </a:schemeClr>
+            </a:gs>
+            <a:gs pos="100000">
+              <a:schemeClr val="phClr">
+                <a:lumMod val="99000"/>
+                <a:satMod val="120000"/>
+                <a:shade val="78000"/>
+              </a:schemeClr>
+            </a:gs>
+          </a:gsLst>
+          <a:lin ang="5400000" scaled="0"/>
+        </a:gradFill>
+      </a:fillStyleLst>
+      <a:lnStyleLst>
+        <a:ln w="6350" cap="flat" cmpd="sng" algn="ctr">
+          <a:solidFill>
+            <a:schemeClr val="phClr"/>
+          </a:solidFill>
+          <a:prstDash val="solid"/>
+          <a:miter lim="800000"/>
+        </a:ln>
+        <a:ln w="12700" cap="flat" cmpd="sng" algn="ctr">
+          <a:solidFill>
+            <a:schemeClr val="phClr"/>
+          </a:solidFill>
+          <a:prstDash val="solid"/>
+          <a:miter lim="800000"/>
+        </a:ln>
+        <a:ln w="19050" cap="flat" cmpd="sng" algn="ctr">
+          <a:solidFill>
+            <a:schemeClr val="phClr"/>
+          </a:solidFill>
+          <a:prstDash val="solid"/>
+          <a:miter lim="800000"/>
+        </a:ln>
+      </a:lnStyleLst>
+      <a:effectStyleLst>
+        <a:effectStyle>
+          <a:effectLst/>
+        </a:effectStyle>
+        <a:effectStyle>
+          <a:effectLst/>
+        </a:effectStyle>
+        <a:effectStyle>
+          <a:effectLst>
+            <a:outerShdw blurRad="57150" dist="19050" dir="5400000" algn="ctr" rotWithShape="0">
+              <a:srgbClr val="000000">
+                <a:alpha val="63000"/>
+              </a:srgbClr>
+            </a:outerShdw>
+          </a:effectLst>
+        </a:effectStyle>
+      </a:effectStyleLst>
+      <a:bgFillStyleLst>
+        <a:solidFill>
+          <a:schemeClr val="phClr"/>
+        </a:solidFill>
+        <a:solidFill>
+          <a:schemeClr val="phClr">
+            <a:tint val="95000"/>
+            <a:satMod val="170000"/>
+          </a:schemeClr>
+        </a:solidFill>
+        <a:gradFill rotWithShape="1">
+          <a:gsLst>
+            <a:gs pos="0">
+              <a:schemeClr val="phClr">
+                <a:tint val="93000"/>
+                <a:satMod val="150000"/>
+                <a:shade val="98000"/>
+                <a:lumMod val="102000"/>
+              </a:schemeClr>
+            </a:gs>
+            <a:gs pos="50000">
+              <a:schemeClr val="phClr">
+                <a:tint val="98000"/>
+                <a:satMod val="130000"/>
+                <a:shade val="90000"/>
+                <a:lumMod val="103000"/>
+              </a:schemeClr>
+            </a:gs>
+            <a:gs pos="100000">
+              <a:schemeClr val="phClr">
+                <a:shade val="63000"/>
+                <a:satMod val="120000"/>
+              </a:schemeClr>
+            </a:gs>
+          </a:gsLst>
+          <a:lin ang="5400000" scaled="0"/>
+        </a:gradFill>
+      </a:bgFillStyleLst>
+    </a:fmtScheme>
+  </a:themeElements>
+  <a:objectDefaults/>
+  <a:extraClrSchemeLst/>
+  <a:extLst>
+    <a:ext uri="{05A4C25C-085E-4340-85A3-A5531E510DB2}">
+      <thm15:themeFamily xmlns:thm15="http://schemas.microsoft.com/office/thememl/2012/main" name="Office Theme" id="{62F939B6-93AF-4DB8-9C6B-D6C7DFDC589F}" vid="{4A3C46E8-61CC-4603-A589-7422A47A8E4A}"/>
+    </a:ext>
+  </a:extLst>
+</a:theme>
 </file>
</xml_diff>